<commit_message>
Add first lecture project slides
</commit_message>
<xml_diff>
--- a/Lecture_First.pptx
+++ b/Lecture_First.pptx
@@ -6,14 +6,39 @@
   </p:sldMasterIdLst>
   <p:sldIdLst>
     <p:sldId id="256" r:id="rId2"/>
-    <p:sldId id="265" r:id="rId3"/>
-    <p:sldId id="257" r:id="rId4"/>
-    <p:sldId id="259" r:id="rId5"/>
-    <p:sldId id="260" r:id="rId6"/>
-    <p:sldId id="261" r:id="rId7"/>
-    <p:sldId id="262" r:id="rId8"/>
-    <p:sldId id="263" r:id="rId9"/>
-    <p:sldId id="264" r:id="rId10"/>
+    <p:sldId id="290" r:id="rId3"/>
+    <p:sldId id="266" r:id="rId4"/>
+    <p:sldId id="267" r:id="rId5"/>
+    <p:sldId id="268" r:id="rId6"/>
+    <p:sldId id="269" r:id="rId7"/>
+    <p:sldId id="270" r:id="rId8"/>
+    <p:sldId id="271" r:id="rId9"/>
+    <p:sldId id="272" r:id="rId10"/>
+    <p:sldId id="273" r:id="rId11"/>
+    <p:sldId id="274" r:id="rId12"/>
+    <p:sldId id="275" r:id="rId13"/>
+    <p:sldId id="276" r:id="rId14"/>
+    <p:sldId id="277" r:id="rId15"/>
+    <p:sldId id="278" r:id="rId16"/>
+    <p:sldId id="279" r:id="rId17"/>
+    <p:sldId id="280" r:id="rId18"/>
+    <p:sldId id="281" r:id="rId19"/>
+    <p:sldId id="282" r:id="rId20"/>
+    <p:sldId id="283" r:id="rId21"/>
+    <p:sldId id="284" r:id="rId22"/>
+    <p:sldId id="286" r:id="rId23"/>
+    <p:sldId id="287" r:id="rId24"/>
+    <p:sldId id="285" r:id="rId25"/>
+    <p:sldId id="289" r:id="rId26"/>
+    <p:sldId id="288" r:id="rId27"/>
+    <p:sldId id="265" r:id="rId28"/>
+    <p:sldId id="257" r:id="rId29"/>
+    <p:sldId id="259" r:id="rId30"/>
+    <p:sldId id="260" r:id="rId31"/>
+    <p:sldId id="261" r:id="rId32"/>
+    <p:sldId id="262" r:id="rId33"/>
+    <p:sldId id="263" r:id="rId34"/>
+    <p:sldId id="264" r:id="rId35"/>
   </p:sldIdLst>
   <p:sldSz cx="12192000" cy="6858000"/>
   <p:notesSz cx="6858000" cy="9144000"/>
@@ -251,7 +276,7 @@
           <a:p>
             <a:fld id="{C1BCA859-2F17-4E6E-8E3E-D093A6E3197C}" type="datetimeFigureOut">
               <a:rPr lang="en-CA" smtClean="0"/>
-              <a:t>2019-07-25</a:t>
+              <a:t>2019-08-23</a:t>
             </a:fld>
             <a:endParaRPr lang="en-CA"/>
           </a:p>
@@ -421,7 +446,7 @@
           <a:p>
             <a:fld id="{C1BCA859-2F17-4E6E-8E3E-D093A6E3197C}" type="datetimeFigureOut">
               <a:rPr lang="en-CA" smtClean="0"/>
-              <a:t>2019-07-25</a:t>
+              <a:t>2019-08-23</a:t>
             </a:fld>
             <a:endParaRPr lang="en-CA"/>
           </a:p>
@@ -601,7 +626,7 @@
           <a:p>
             <a:fld id="{C1BCA859-2F17-4E6E-8E3E-D093A6E3197C}" type="datetimeFigureOut">
               <a:rPr lang="en-CA" smtClean="0"/>
-              <a:t>2019-07-25</a:t>
+              <a:t>2019-08-23</a:t>
             </a:fld>
             <a:endParaRPr lang="en-CA"/>
           </a:p>
@@ -771,7 +796,7 @@
           <a:p>
             <a:fld id="{C1BCA859-2F17-4E6E-8E3E-D093A6E3197C}" type="datetimeFigureOut">
               <a:rPr lang="en-CA" smtClean="0"/>
-              <a:t>2019-07-25</a:t>
+              <a:t>2019-08-23</a:t>
             </a:fld>
             <a:endParaRPr lang="en-CA"/>
           </a:p>
@@ -1017,7 +1042,7 @@
           <a:p>
             <a:fld id="{C1BCA859-2F17-4E6E-8E3E-D093A6E3197C}" type="datetimeFigureOut">
               <a:rPr lang="en-CA" smtClean="0"/>
-              <a:t>2019-07-25</a:t>
+              <a:t>2019-08-23</a:t>
             </a:fld>
             <a:endParaRPr lang="en-CA"/>
           </a:p>
@@ -1249,7 +1274,7 @@
           <a:p>
             <a:fld id="{C1BCA859-2F17-4E6E-8E3E-D093A6E3197C}" type="datetimeFigureOut">
               <a:rPr lang="en-CA" smtClean="0"/>
-              <a:t>2019-07-25</a:t>
+              <a:t>2019-08-23</a:t>
             </a:fld>
             <a:endParaRPr lang="en-CA"/>
           </a:p>
@@ -1616,7 +1641,7 @@
           <a:p>
             <a:fld id="{C1BCA859-2F17-4E6E-8E3E-D093A6E3197C}" type="datetimeFigureOut">
               <a:rPr lang="en-CA" smtClean="0"/>
-              <a:t>2019-07-25</a:t>
+              <a:t>2019-08-23</a:t>
             </a:fld>
             <a:endParaRPr lang="en-CA"/>
           </a:p>
@@ -1734,7 +1759,7 @@
           <a:p>
             <a:fld id="{C1BCA859-2F17-4E6E-8E3E-D093A6E3197C}" type="datetimeFigureOut">
               <a:rPr lang="en-CA" smtClean="0"/>
-              <a:t>2019-07-25</a:t>
+              <a:t>2019-08-23</a:t>
             </a:fld>
             <a:endParaRPr lang="en-CA"/>
           </a:p>
@@ -1829,7 +1854,7 @@
           <a:p>
             <a:fld id="{C1BCA859-2F17-4E6E-8E3E-D093A6E3197C}" type="datetimeFigureOut">
               <a:rPr lang="en-CA" smtClean="0"/>
-              <a:t>2019-07-25</a:t>
+              <a:t>2019-08-23</a:t>
             </a:fld>
             <a:endParaRPr lang="en-CA"/>
           </a:p>
@@ -2106,7 +2131,7 @@
           <a:p>
             <a:fld id="{C1BCA859-2F17-4E6E-8E3E-D093A6E3197C}" type="datetimeFigureOut">
               <a:rPr lang="en-CA" smtClean="0"/>
-              <a:t>2019-07-25</a:t>
+              <a:t>2019-08-23</a:t>
             </a:fld>
             <a:endParaRPr lang="en-CA"/>
           </a:p>
@@ -2359,7 +2384,7 @@
           <a:p>
             <a:fld id="{C1BCA859-2F17-4E6E-8E3E-D093A6E3197C}" type="datetimeFigureOut">
               <a:rPr lang="en-CA" smtClean="0"/>
-              <a:t>2019-07-25</a:t>
+              <a:t>2019-08-23</a:t>
             </a:fld>
             <a:endParaRPr lang="en-CA"/>
           </a:p>
@@ -2572,7 +2597,7 @@
           <a:p>
             <a:fld id="{C1BCA859-2F17-4E6E-8E3E-D093A6E3197C}" type="datetimeFigureOut">
               <a:rPr lang="en-CA" smtClean="0"/>
-              <a:t>2019-07-25</a:t>
+              <a:t>2019-08-23</a:t>
             </a:fld>
             <a:endParaRPr lang="en-CA"/>
           </a:p>
@@ -3017,7 +3042,7 @@
           <a:p>
             <a:r>
               <a:rPr lang="en-CA" dirty="0" smtClean="0"/>
-              <a:t>Russell Butler, Ph.D.</a:t>
+              <a:t>Instructor: Russell Butler</a:t>
             </a:r>
           </a:p>
           <a:p>
@@ -3039,6 +3064,1745 @@
   <p:clrMapOvr>
     <a:masterClrMapping/>
   </p:clrMapOvr>
+  <p:timing>
+    <p:tnLst>
+      <p:par>
+        <p:cTn id="1" dur="indefinite" restart="never" nodeType="tmRoot"/>
+      </p:par>
+    </p:tnLst>
+  </p:timing>
+</p:sld>
+</file>
+
+<file path=ppt/slides/slide10.xml><?xml version="1.0" encoding="utf-8"?>
+<p:sld xmlns:a="http://schemas.openxmlformats.org/drawingml/2006/main" xmlns:r="http://schemas.openxmlformats.org/officeDocument/2006/relationships" xmlns:p="http://schemas.openxmlformats.org/presentationml/2006/main">
+  <p:cSld>
+    <p:spTree>
+      <p:nvGrpSpPr>
+        <p:cNvPr id="1" name=""/>
+        <p:cNvGrpSpPr/>
+        <p:nvPr/>
+      </p:nvGrpSpPr>
+      <p:grpSpPr>
+        <a:xfrm>
+          <a:off x="0" y="0"/>
+          <a:ext cx="0" cy="0"/>
+          <a:chOff x="0" y="0"/>
+          <a:chExt cx="0" cy="0"/>
+        </a:xfrm>
+      </p:grpSpPr>
+      <p:sp>
+        <p:nvSpPr>
+          <p:cNvPr id="2" name="Title 1"/>
+          <p:cNvSpPr>
+            <a:spLocks noGrp="1"/>
+          </p:cNvSpPr>
+          <p:nvPr>
+            <p:ph type="title"/>
+          </p:nvPr>
+        </p:nvSpPr>
+        <p:spPr/>
+        <p:txBody>
+          <a:bodyPr/>
+          <a:lstStyle/>
+          <a:p>
+            <a:r>
+              <a:rPr lang="en-CA" dirty="0" smtClean="0"/>
+              <a:t>Subscription boom</a:t>
+            </a:r>
+            <a:endParaRPr lang="en-CA" dirty="0"/>
+          </a:p>
+        </p:txBody>
+      </p:sp>
+      <p:sp>
+        <p:nvSpPr>
+          <p:cNvPr id="3" name="Content Placeholder 2"/>
+          <p:cNvSpPr>
+            <a:spLocks noGrp="1"/>
+          </p:cNvSpPr>
+          <p:nvPr>
+            <p:ph idx="1"/>
+          </p:nvPr>
+        </p:nvSpPr>
+        <p:spPr>
+          <a:xfrm>
+            <a:off x="838200" y="1825625"/>
+            <a:ext cx="3135697" cy="4351338"/>
+          </a:xfrm>
+        </p:spPr>
+        <p:txBody>
+          <a:bodyPr>
+            <a:normAutofit fontScale="85000" lnSpcReduction="20000"/>
+          </a:bodyPr>
+          <a:lstStyle/>
+          <a:p>
+            <a:r>
+              <a:rPr lang="en-CA" dirty="0" smtClean="0"/>
+              <a:t>Global consumer spend in non-gaming apps grew 120% from 2016</a:t>
+            </a:r>
+          </a:p>
+          <a:p>
+            <a:r>
+              <a:rPr lang="en-CA" dirty="0" smtClean="0"/>
+              <a:t>Top 5 most lucrative non-gaming apps of 2018 were all subscription based</a:t>
+            </a:r>
+          </a:p>
+          <a:p>
+            <a:r>
+              <a:rPr lang="en-CA" dirty="0" smtClean="0"/>
+              <a:t>Forecasted to increase to 75 billion by 2022</a:t>
+            </a:r>
+          </a:p>
+          <a:p>
+            <a:r>
+              <a:rPr lang="en-CA" dirty="0" smtClean="0"/>
+              <a:t>Netflix has stopped offering subscriptions through app store</a:t>
+            </a:r>
+            <a:endParaRPr lang="en-CA" dirty="0"/>
+          </a:p>
+        </p:txBody>
+      </p:sp>
+      <p:pic>
+        <p:nvPicPr>
+          <p:cNvPr id="4" name="Picture 3"/>
+          <p:cNvPicPr>
+            <a:picLocks noChangeAspect="1"/>
+          </p:cNvPicPr>
+          <p:nvPr/>
+        </p:nvPicPr>
+        <p:blipFill>
+          <a:blip r:embed="rId2"/>
+          <a:stretch>
+            <a:fillRect/>
+          </a:stretch>
+        </p:blipFill>
+        <p:spPr>
+          <a:xfrm>
+            <a:off x="3973897" y="1523135"/>
+            <a:ext cx="8218103" cy="4653828"/>
+          </a:xfrm>
+          <a:prstGeom prst="rect">
+            <a:avLst/>
+          </a:prstGeom>
+        </p:spPr>
+      </p:pic>
+    </p:spTree>
+    <p:extLst>
+      <p:ext uri="{BB962C8B-B14F-4D97-AF65-F5344CB8AC3E}">
+        <p14:creationId xmlns:p14="http://schemas.microsoft.com/office/powerpoint/2010/main" val="2901931313"/>
+      </p:ext>
+    </p:extLst>
+  </p:cSld>
+  <p:clrMapOvr>
+    <a:masterClrMapping/>
+  </p:clrMapOvr>
+  <p:timing>
+    <p:tnLst>
+      <p:par>
+        <p:cTn id="1" dur="indefinite" restart="never" nodeType="tmRoot"/>
+      </p:par>
+    </p:tnLst>
+  </p:timing>
+</p:sld>
+</file>
+
+<file path=ppt/slides/slide11.xml><?xml version="1.0" encoding="utf-8"?>
+<p:sld xmlns:a="http://schemas.openxmlformats.org/drawingml/2006/main" xmlns:r="http://schemas.openxmlformats.org/officeDocument/2006/relationships" xmlns:p="http://schemas.openxmlformats.org/presentationml/2006/main">
+  <p:cSld>
+    <p:spTree>
+      <p:nvGrpSpPr>
+        <p:cNvPr id="1" name=""/>
+        <p:cNvGrpSpPr/>
+        <p:nvPr/>
+      </p:nvGrpSpPr>
+      <p:grpSpPr>
+        <a:xfrm>
+          <a:off x="0" y="0"/>
+          <a:ext cx="0" cy="0"/>
+          <a:chOff x="0" y="0"/>
+          <a:chExt cx="0" cy="0"/>
+        </a:xfrm>
+      </p:grpSpPr>
+      <p:sp>
+        <p:nvSpPr>
+          <p:cNvPr id="2" name="Title 1"/>
+          <p:cNvSpPr>
+            <a:spLocks noGrp="1"/>
+          </p:cNvSpPr>
+          <p:nvPr>
+            <p:ph type="title"/>
+          </p:nvPr>
+        </p:nvSpPr>
+        <p:spPr/>
+        <p:txBody>
+          <a:bodyPr/>
+          <a:lstStyle/>
+          <a:p>
+            <a:r>
+              <a:rPr lang="en-CA" dirty="0" smtClean="0"/>
+              <a:t>Gaming trends</a:t>
+            </a:r>
+            <a:endParaRPr lang="en-CA" dirty="0"/>
+          </a:p>
+        </p:txBody>
+      </p:sp>
+      <p:sp>
+        <p:nvSpPr>
+          <p:cNvPr id="3" name="Content Placeholder 2"/>
+          <p:cNvSpPr>
+            <a:spLocks noGrp="1"/>
+          </p:cNvSpPr>
+          <p:nvPr>
+            <p:ph idx="1"/>
+          </p:nvPr>
+        </p:nvSpPr>
+        <p:spPr>
+          <a:xfrm>
+            <a:off x="838200" y="1825625"/>
+            <a:ext cx="3913909" cy="4351338"/>
+          </a:xfrm>
+        </p:spPr>
+        <p:txBody>
+          <a:bodyPr>
+            <a:normAutofit fontScale="92500" lnSpcReduction="20000"/>
+          </a:bodyPr>
+          <a:lstStyle/>
+          <a:p>
+            <a:r>
+              <a:rPr lang="en-CA" dirty="0" smtClean="0"/>
+              <a:t>Games accounted for 74% of consumer spend in 2018</a:t>
+            </a:r>
+          </a:p>
+          <a:p>
+            <a:r>
+              <a:rPr lang="en-CA" dirty="0" smtClean="0"/>
+              <a:t>Mobile gaming is fastest growing sector of gaming market, beating consoles, PC, and handhelds</a:t>
+            </a:r>
+          </a:p>
+          <a:p>
+            <a:r>
+              <a:rPr lang="en-CA" dirty="0" smtClean="0"/>
+              <a:t>Mobile gaming will reach 60% of gaming market share by 2019, up 35% from 2013</a:t>
+            </a:r>
+          </a:p>
+          <a:p>
+            <a:r>
+              <a:rPr lang="en-CA" dirty="0" smtClean="0"/>
+              <a:t>China, US, Japan account for 75% of gaming spend</a:t>
+            </a:r>
+          </a:p>
+          <a:p>
+            <a:endParaRPr lang="en-CA" dirty="0" smtClean="0"/>
+          </a:p>
+          <a:p>
+            <a:endParaRPr lang="en-CA" dirty="0"/>
+          </a:p>
+        </p:txBody>
+      </p:sp>
+      <p:pic>
+        <p:nvPicPr>
+          <p:cNvPr id="4" name="Picture 3"/>
+          <p:cNvPicPr>
+            <a:picLocks noChangeAspect="1"/>
+          </p:cNvPicPr>
+          <p:nvPr/>
+        </p:nvPicPr>
+        <p:blipFill>
+          <a:blip r:embed="rId2"/>
+          <a:stretch>
+            <a:fillRect/>
+          </a:stretch>
+        </p:blipFill>
+        <p:spPr>
+          <a:xfrm>
+            <a:off x="4603442" y="2225748"/>
+            <a:ext cx="7588558" cy="4031673"/>
+          </a:xfrm>
+          <a:prstGeom prst="rect">
+            <a:avLst/>
+          </a:prstGeom>
+        </p:spPr>
+      </p:pic>
+    </p:spTree>
+    <p:extLst>
+      <p:ext uri="{BB962C8B-B14F-4D97-AF65-F5344CB8AC3E}">
+        <p14:creationId xmlns:p14="http://schemas.microsoft.com/office/powerpoint/2010/main" val="2542464319"/>
+      </p:ext>
+    </p:extLst>
+  </p:cSld>
+  <p:clrMapOvr>
+    <a:masterClrMapping/>
+  </p:clrMapOvr>
+  <p:timing>
+    <p:tnLst>
+      <p:par>
+        <p:cTn id="1" dur="indefinite" restart="never" nodeType="tmRoot"/>
+      </p:par>
+    </p:tnLst>
+  </p:timing>
+</p:sld>
+</file>
+
+<file path=ppt/slides/slide12.xml><?xml version="1.0" encoding="utf-8"?>
+<p:sld xmlns:a="http://schemas.openxmlformats.org/drawingml/2006/main" xmlns:r="http://schemas.openxmlformats.org/officeDocument/2006/relationships" xmlns:p="http://schemas.openxmlformats.org/presentationml/2006/main">
+  <p:cSld>
+    <p:spTree>
+      <p:nvGrpSpPr>
+        <p:cNvPr id="1" name=""/>
+        <p:cNvGrpSpPr/>
+        <p:nvPr/>
+      </p:nvGrpSpPr>
+      <p:grpSpPr>
+        <a:xfrm>
+          <a:off x="0" y="0"/>
+          <a:ext cx="0" cy="0"/>
+          <a:chOff x="0" y="0"/>
+          <a:chExt cx="0" cy="0"/>
+        </a:xfrm>
+      </p:grpSpPr>
+      <p:sp>
+        <p:nvSpPr>
+          <p:cNvPr id="2" name="Title 1"/>
+          <p:cNvSpPr>
+            <a:spLocks noGrp="1"/>
+          </p:cNvSpPr>
+          <p:nvPr>
+            <p:ph type="title"/>
+          </p:nvPr>
+        </p:nvSpPr>
+        <p:spPr/>
+        <p:txBody>
+          <a:bodyPr/>
+          <a:lstStyle/>
+          <a:p>
+            <a:r>
+              <a:rPr lang="en-CA" dirty="0" smtClean="0"/>
+              <a:t>Gaming trends</a:t>
+            </a:r>
+            <a:endParaRPr lang="en-CA" dirty="0"/>
+          </a:p>
+        </p:txBody>
+      </p:sp>
+      <p:sp>
+        <p:nvSpPr>
+          <p:cNvPr id="3" name="Content Placeholder 2"/>
+          <p:cNvSpPr>
+            <a:spLocks noGrp="1"/>
+          </p:cNvSpPr>
+          <p:nvPr>
+            <p:ph idx="1"/>
+          </p:nvPr>
+        </p:nvSpPr>
+        <p:spPr>
+          <a:xfrm>
+            <a:off x="838200" y="1825625"/>
+            <a:ext cx="3484418" cy="4351338"/>
+          </a:xfrm>
+        </p:spPr>
+        <p:txBody>
+          <a:bodyPr>
+            <a:normAutofit fontScale="70000" lnSpcReduction="20000"/>
+          </a:bodyPr>
+          <a:lstStyle/>
+          <a:p>
+            <a:r>
+              <a:rPr lang="en-CA" dirty="0" smtClean="0"/>
+              <a:t>Battle </a:t>
+            </a:r>
+            <a:r>
+              <a:rPr lang="en-CA" dirty="0" err="1" smtClean="0"/>
+              <a:t>royale</a:t>
+            </a:r>
+            <a:r>
+              <a:rPr lang="en-CA" dirty="0" smtClean="0"/>
+              <a:t> and hyper-casual games dominated 2018</a:t>
+            </a:r>
+          </a:p>
+          <a:p>
+            <a:r>
+              <a:rPr lang="en-CA" dirty="0" smtClean="0"/>
+              <a:t>PUBG Mobile, </a:t>
+            </a:r>
+            <a:r>
+              <a:rPr lang="en-CA" dirty="0" err="1" smtClean="0"/>
+              <a:t>fortnite</a:t>
+            </a:r>
+            <a:r>
+              <a:rPr lang="en-CA" dirty="0" smtClean="0"/>
+              <a:t>, rules of survival, free fire</a:t>
+            </a:r>
+          </a:p>
+          <a:p>
+            <a:r>
+              <a:rPr lang="en-CA" dirty="0" smtClean="0"/>
+              <a:t>Mobile devices are powerful!</a:t>
+            </a:r>
+          </a:p>
+          <a:p>
+            <a:r>
+              <a:rPr lang="en-CA" dirty="0" smtClean="0"/>
+              <a:t>Competitive online gaming culture</a:t>
+            </a:r>
+          </a:p>
+          <a:p>
+            <a:r>
+              <a:rPr lang="en-CA" dirty="0" smtClean="0"/>
+              <a:t>Hyper-casual games (simple gameplay mechanics)</a:t>
+            </a:r>
+          </a:p>
+          <a:p>
+            <a:r>
+              <a:rPr lang="en-CA" dirty="0" smtClean="0"/>
+              <a:t>Voodoo, Helix Jump, Hole.io</a:t>
+            </a:r>
+          </a:p>
+          <a:p>
+            <a:r>
+              <a:rPr lang="en-CA" dirty="0" smtClean="0"/>
+              <a:t>Candy crush, </a:t>
+            </a:r>
+            <a:r>
+              <a:rPr lang="en-CA" dirty="0" err="1" smtClean="0"/>
+              <a:t>pokemon</a:t>
+            </a:r>
+            <a:r>
+              <a:rPr lang="en-CA" dirty="0" smtClean="0"/>
+              <a:t> go, still popular</a:t>
+            </a:r>
+          </a:p>
+        </p:txBody>
+      </p:sp>
+      <p:pic>
+        <p:nvPicPr>
+          <p:cNvPr id="4" name="Picture 3"/>
+          <p:cNvPicPr>
+            <a:picLocks noChangeAspect="1"/>
+          </p:cNvPicPr>
+          <p:nvPr/>
+        </p:nvPicPr>
+        <p:blipFill>
+          <a:blip r:embed="rId2"/>
+          <a:stretch>
+            <a:fillRect/>
+          </a:stretch>
+        </p:blipFill>
+        <p:spPr>
+          <a:xfrm>
+            <a:off x="4322618" y="1589543"/>
+            <a:ext cx="7869382" cy="4490438"/>
+          </a:xfrm>
+          <a:prstGeom prst="rect">
+            <a:avLst/>
+          </a:prstGeom>
+        </p:spPr>
+      </p:pic>
+    </p:spTree>
+    <p:extLst>
+      <p:ext uri="{BB962C8B-B14F-4D97-AF65-F5344CB8AC3E}">
+        <p14:creationId xmlns:p14="http://schemas.microsoft.com/office/powerpoint/2010/main" val="621680067"/>
+      </p:ext>
+    </p:extLst>
+  </p:cSld>
+  <p:clrMapOvr>
+    <a:masterClrMapping/>
+  </p:clrMapOvr>
+  <p:timing>
+    <p:tnLst>
+      <p:par>
+        <p:cTn id="1" dur="indefinite" restart="never" nodeType="tmRoot"/>
+      </p:par>
+    </p:tnLst>
+  </p:timing>
+</p:sld>
+</file>
+
+<file path=ppt/slides/slide13.xml><?xml version="1.0" encoding="utf-8"?>
+<p:sld xmlns:a="http://schemas.openxmlformats.org/drawingml/2006/main" xmlns:r="http://schemas.openxmlformats.org/officeDocument/2006/relationships" xmlns:p="http://schemas.openxmlformats.org/presentationml/2006/main">
+  <p:cSld>
+    <p:spTree>
+      <p:nvGrpSpPr>
+        <p:cNvPr id="1" name=""/>
+        <p:cNvGrpSpPr/>
+        <p:nvPr/>
+      </p:nvGrpSpPr>
+      <p:grpSpPr>
+        <a:xfrm>
+          <a:off x="0" y="0"/>
+          <a:ext cx="0" cy="0"/>
+          <a:chOff x="0" y="0"/>
+          <a:chExt cx="0" cy="0"/>
+        </a:xfrm>
+      </p:grpSpPr>
+      <p:sp>
+        <p:nvSpPr>
+          <p:cNvPr id="2" name="Title 1"/>
+          <p:cNvSpPr>
+            <a:spLocks noGrp="1"/>
+          </p:cNvSpPr>
+          <p:nvPr>
+            <p:ph type="title"/>
+          </p:nvPr>
+        </p:nvSpPr>
+        <p:spPr/>
+        <p:txBody>
+          <a:bodyPr/>
+          <a:lstStyle/>
+          <a:p>
+            <a:r>
+              <a:rPr lang="en-CA" dirty="0" smtClean="0"/>
+              <a:t>Retail trends</a:t>
+            </a:r>
+            <a:endParaRPr lang="en-CA" dirty="0"/>
+          </a:p>
+        </p:txBody>
+      </p:sp>
+      <p:sp>
+        <p:nvSpPr>
+          <p:cNvPr id="3" name="Content Placeholder 2"/>
+          <p:cNvSpPr>
+            <a:spLocks noGrp="1"/>
+          </p:cNvSpPr>
+          <p:nvPr>
+            <p:ph idx="1"/>
+          </p:nvPr>
+        </p:nvSpPr>
+        <p:spPr>
+          <a:xfrm>
+            <a:off x="838200" y="1825625"/>
+            <a:ext cx="3373582" cy="4351338"/>
+          </a:xfrm>
+        </p:spPr>
+        <p:txBody>
+          <a:bodyPr>
+            <a:normAutofit fontScale="85000" lnSpcReduction="10000"/>
+          </a:bodyPr>
+          <a:lstStyle/>
+          <a:p>
+            <a:r>
+              <a:rPr lang="en-CA" dirty="0" smtClean="0"/>
+              <a:t>Time spent in shopping apps up 45% from 2016-2018 </a:t>
+            </a:r>
+          </a:p>
+          <a:p>
+            <a:r>
+              <a:rPr lang="en-CA" dirty="0" smtClean="0"/>
+              <a:t>70% growth in US, 475% growth in Thailand</a:t>
+            </a:r>
+          </a:p>
+          <a:p>
+            <a:r>
+              <a:rPr lang="en-CA" dirty="0" smtClean="0"/>
+              <a:t>Time spend in shopping apps correlates with e-commerce sales</a:t>
+            </a:r>
+          </a:p>
+          <a:p>
+            <a:r>
+              <a:rPr lang="en-CA" dirty="0" smtClean="0"/>
+              <a:t>Mobile projected to comprise 75% of e-commerce sales by 2021</a:t>
+            </a:r>
+          </a:p>
+          <a:p>
+            <a:endParaRPr lang="en-CA" dirty="0"/>
+          </a:p>
+        </p:txBody>
+      </p:sp>
+      <p:pic>
+        <p:nvPicPr>
+          <p:cNvPr id="4" name="Picture 3"/>
+          <p:cNvPicPr>
+            <a:picLocks noChangeAspect="1"/>
+          </p:cNvPicPr>
+          <p:nvPr/>
+        </p:nvPicPr>
+        <p:blipFill>
+          <a:blip r:embed="rId2"/>
+          <a:stretch>
+            <a:fillRect/>
+          </a:stretch>
+        </p:blipFill>
+        <p:spPr>
+          <a:xfrm>
+            <a:off x="4391025" y="1536845"/>
+            <a:ext cx="7800975" cy="4581525"/>
+          </a:xfrm>
+          <a:prstGeom prst="rect">
+            <a:avLst/>
+          </a:prstGeom>
+        </p:spPr>
+      </p:pic>
+    </p:spTree>
+    <p:extLst>
+      <p:ext uri="{BB962C8B-B14F-4D97-AF65-F5344CB8AC3E}">
+        <p14:creationId xmlns:p14="http://schemas.microsoft.com/office/powerpoint/2010/main" val="3569141510"/>
+      </p:ext>
+    </p:extLst>
+  </p:cSld>
+  <p:clrMapOvr>
+    <a:masterClrMapping/>
+  </p:clrMapOvr>
+  <p:timing>
+    <p:tnLst>
+      <p:par>
+        <p:cTn id="1" dur="indefinite" restart="never" nodeType="tmRoot"/>
+      </p:par>
+    </p:tnLst>
+  </p:timing>
+</p:sld>
+</file>
+
+<file path=ppt/slides/slide14.xml><?xml version="1.0" encoding="utf-8"?>
+<p:sld xmlns:a="http://schemas.openxmlformats.org/drawingml/2006/main" xmlns:r="http://schemas.openxmlformats.org/officeDocument/2006/relationships" xmlns:p="http://schemas.openxmlformats.org/presentationml/2006/main">
+  <p:cSld>
+    <p:spTree>
+      <p:nvGrpSpPr>
+        <p:cNvPr id="1" name=""/>
+        <p:cNvGrpSpPr/>
+        <p:nvPr/>
+      </p:nvGrpSpPr>
+      <p:grpSpPr>
+        <a:xfrm>
+          <a:off x="0" y="0"/>
+          <a:ext cx="0" cy="0"/>
+          <a:chOff x="0" y="0"/>
+          <a:chExt cx="0" cy="0"/>
+        </a:xfrm>
+      </p:grpSpPr>
+      <p:sp>
+        <p:nvSpPr>
+          <p:cNvPr id="2" name="Title 1"/>
+          <p:cNvSpPr>
+            <a:spLocks noGrp="1"/>
+          </p:cNvSpPr>
+          <p:nvPr>
+            <p:ph type="title"/>
+          </p:nvPr>
+        </p:nvSpPr>
+        <p:spPr/>
+        <p:txBody>
+          <a:bodyPr/>
+          <a:lstStyle/>
+          <a:p>
+            <a:r>
+              <a:rPr lang="en-CA" dirty="0" smtClean="0"/>
+              <a:t>Peer to peer marketplaces</a:t>
+            </a:r>
+            <a:endParaRPr lang="en-CA" dirty="0"/>
+          </a:p>
+        </p:txBody>
+      </p:sp>
+      <p:sp>
+        <p:nvSpPr>
+          <p:cNvPr id="3" name="Content Placeholder 2"/>
+          <p:cNvSpPr>
+            <a:spLocks noGrp="1"/>
+          </p:cNvSpPr>
+          <p:nvPr>
+            <p:ph idx="1"/>
+          </p:nvPr>
+        </p:nvSpPr>
+        <p:spPr>
+          <a:xfrm>
+            <a:off x="838200" y="1825625"/>
+            <a:ext cx="5257800" cy="4351338"/>
+          </a:xfrm>
+        </p:spPr>
+        <p:txBody>
+          <a:bodyPr/>
+          <a:lstStyle/>
+          <a:p>
+            <a:r>
+              <a:rPr lang="en-CA" dirty="0" smtClean="0"/>
+              <a:t>p2p markets were the 2</a:t>
+            </a:r>
+            <a:r>
+              <a:rPr lang="en-CA" baseline="30000" dirty="0" smtClean="0"/>
+              <a:t>nd</a:t>
+            </a:r>
+            <a:r>
+              <a:rPr lang="en-CA" dirty="0" smtClean="0"/>
+              <a:t> most popular way to shop mobile in 2018</a:t>
+            </a:r>
+          </a:p>
+          <a:p>
+            <a:r>
+              <a:rPr lang="en-CA" dirty="0" err="1" smtClean="0"/>
+              <a:t>Shopee</a:t>
+            </a:r>
+            <a:r>
+              <a:rPr lang="en-CA" dirty="0" smtClean="0"/>
+              <a:t>, </a:t>
+            </a:r>
+            <a:r>
+              <a:rPr lang="en-CA" dirty="0" err="1" smtClean="0"/>
+              <a:t>ebay</a:t>
+            </a:r>
+            <a:r>
+              <a:rPr lang="en-CA" dirty="0" smtClean="0"/>
+              <a:t>, </a:t>
+            </a:r>
+            <a:r>
+              <a:rPr lang="en-CA" dirty="0" err="1" smtClean="0"/>
+              <a:t>Mercadolibre</a:t>
+            </a:r>
+            <a:r>
+              <a:rPr lang="en-CA" dirty="0" smtClean="0"/>
+              <a:t>, </a:t>
+            </a:r>
+            <a:r>
+              <a:rPr lang="en-CA" dirty="0" err="1" smtClean="0"/>
+              <a:t>letgo</a:t>
+            </a:r>
+            <a:r>
+              <a:rPr lang="en-CA" dirty="0" smtClean="0"/>
+              <a:t>, OLX the top 5 p2p marketplace apps by download in 2018</a:t>
+            </a:r>
+            <a:endParaRPr lang="en-CA" dirty="0"/>
+          </a:p>
+        </p:txBody>
+      </p:sp>
+      <p:pic>
+        <p:nvPicPr>
+          <p:cNvPr id="4" name="Picture 3"/>
+          <p:cNvPicPr>
+            <a:picLocks noChangeAspect="1"/>
+          </p:cNvPicPr>
+          <p:nvPr/>
+        </p:nvPicPr>
+        <p:blipFill>
+          <a:blip r:embed="rId2"/>
+          <a:stretch>
+            <a:fillRect/>
+          </a:stretch>
+        </p:blipFill>
+        <p:spPr>
+          <a:xfrm>
+            <a:off x="5762625" y="1729582"/>
+            <a:ext cx="6429375" cy="5095875"/>
+          </a:xfrm>
+          <a:prstGeom prst="rect">
+            <a:avLst/>
+          </a:prstGeom>
+        </p:spPr>
+      </p:pic>
+    </p:spTree>
+    <p:extLst>
+      <p:ext uri="{BB962C8B-B14F-4D97-AF65-F5344CB8AC3E}">
+        <p14:creationId xmlns:p14="http://schemas.microsoft.com/office/powerpoint/2010/main" val="1595540952"/>
+      </p:ext>
+    </p:extLst>
+  </p:cSld>
+  <p:clrMapOvr>
+    <a:masterClrMapping/>
+  </p:clrMapOvr>
+  <p:timing>
+    <p:tnLst>
+      <p:par>
+        <p:cTn id="1" dur="indefinite" restart="never" nodeType="tmRoot"/>
+      </p:par>
+    </p:tnLst>
+  </p:timing>
+</p:sld>
+</file>
+
+<file path=ppt/slides/slide15.xml><?xml version="1.0" encoding="utf-8"?>
+<p:sld xmlns:a="http://schemas.openxmlformats.org/drawingml/2006/main" xmlns:r="http://schemas.openxmlformats.org/officeDocument/2006/relationships" xmlns:p="http://schemas.openxmlformats.org/presentationml/2006/main">
+  <p:cSld>
+    <p:spTree>
+      <p:nvGrpSpPr>
+        <p:cNvPr id="1" name=""/>
+        <p:cNvGrpSpPr/>
+        <p:nvPr/>
+      </p:nvGrpSpPr>
+      <p:grpSpPr>
+        <a:xfrm>
+          <a:off x="0" y="0"/>
+          <a:ext cx="0" cy="0"/>
+          <a:chOff x="0" y="0"/>
+          <a:chExt cx="0" cy="0"/>
+        </a:xfrm>
+      </p:grpSpPr>
+      <p:sp>
+        <p:nvSpPr>
+          <p:cNvPr id="2" name="Title 1"/>
+          <p:cNvSpPr>
+            <a:spLocks noGrp="1"/>
+          </p:cNvSpPr>
+          <p:nvPr>
+            <p:ph type="title"/>
+          </p:nvPr>
+        </p:nvSpPr>
+        <p:spPr/>
+        <p:txBody>
+          <a:bodyPr/>
+          <a:lstStyle/>
+          <a:p>
+            <a:r>
+              <a:rPr lang="en-CA" dirty="0" smtClean="0"/>
+              <a:t>Restaurant and food delivery</a:t>
+            </a:r>
+            <a:endParaRPr lang="en-CA" dirty="0"/>
+          </a:p>
+        </p:txBody>
+      </p:sp>
+      <p:sp>
+        <p:nvSpPr>
+          <p:cNvPr id="3" name="Content Placeholder 2"/>
+          <p:cNvSpPr>
+            <a:spLocks noGrp="1"/>
+          </p:cNvSpPr>
+          <p:nvPr>
+            <p:ph idx="1"/>
+          </p:nvPr>
+        </p:nvSpPr>
+        <p:spPr/>
+        <p:txBody>
+          <a:bodyPr>
+            <a:normAutofit fontScale="85000" lnSpcReduction="20000"/>
+          </a:bodyPr>
+          <a:lstStyle/>
+          <a:p>
+            <a:r>
+              <a:rPr lang="en-CA" dirty="0" smtClean="0"/>
+              <a:t>Globally, mobile purchases of food and drink up 130% from 2016 to 2018</a:t>
+            </a:r>
+          </a:p>
+          <a:p>
+            <a:r>
+              <a:rPr lang="en-CA" dirty="0" smtClean="0"/>
+              <a:t>325% growth in </a:t>
+            </a:r>
+            <a:r>
+              <a:rPr lang="en-CA" dirty="0"/>
+              <a:t>F</a:t>
+            </a:r>
+            <a:r>
+              <a:rPr lang="en-CA" dirty="0" smtClean="0"/>
+              <a:t>rance, 230% growth in South Korea</a:t>
+            </a:r>
+          </a:p>
+          <a:p>
+            <a:r>
+              <a:rPr lang="en-CA" dirty="0" smtClean="0"/>
+              <a:t>Growth in fast food apps (quick service restaurants QSRs) and delivery services</a:t>
+            </a:r>
+          </a:p>
+          <a:p>
+            <a:r>
+              <a:rPr lang="en-CA" dirty="0" smtClean="0"/>
+              <a:t>Traditional brick and mortar food/drink industry with strong presence in mobile space</a:t>
+            </a:r>
+          </a:p>
+          <a:p>
+            <a:r>
+              <a:rPr lang="en-CA" dirty="0" smtClean="0"/>
+              <a:t>Top 5 food delivery app downloads up 115% from 2016 to 2018</a:t>
+            </a:r>
+          </a:p>
+          <a:p>
+            <a:pPr lvl="1"/>
+            <a:r>
+              <a:rPr lang="en-CA" dirty="0" smtClean="0"/>
+              <a:t>Particularly in established markets (Canada, US, UK)</a:t>
+            </a:r>
+          </a:p>
+          <a:p>
+            <a:r>
+              <a:rPr lang="en-CA" dirty="0" smtClean="0"/>
+              <a:t>Starbucks and </a:t>
+            </a:r>
+            <a:r>
+              <a:rPr lang="en-CA" dirty="0" err="1" smtClean="0"/>
+              <a:t>UberEats</a:t>
+            </a:r>
+            <a:r>
+              <a:rPr lang="en-CA" dirty="0" smtClean="0"/>
+              <a:t> partnering in China and now US to streamline delivery and morning routine, transforming our daily rituals </a:t>
+            </a:r>
+          </a:p>
+          <a:p>
+            <a:r>
+              <a:rPr lang="en-CA" dirty="0" smtClean="0"/>
+              <a:t>QSRs such as </a:t>
+            </a:r>
+            <a:r>
+              <a:rPr lang="en-CA" dirty="0" err="1" smtClean="0"/>
+              <a:t>Mcdonalds</a:t>
+            </a:r>
+            <a:r>
+              <a:rPr lang="en-CA" dirty="0" smtClean="0"/>
+              <a:t>/Burger </a:t>
+            </a:r>
+            <a:r>
+              <a:rPr lang="en-CA" dirty="0"/>
+              <a:t>K</a:t>
+            </a:r>
+            <a:r>
+              <a:rPr lang="en-CA" dirty="0" smtClean="0"/>
+              <a:t>ing leveraging loyalty programs through their apps (flash deals through push notifications)</a:t>
+            </a:r>
+          </a:p>
+          <a:p>
+            <a:r>
+              <a:rPr lang="en-CA" dirty="0" smtClean="0"/>
+              <a:t>Burger King leveraging location based offers (1 cent whopper) to hit #1 daily downloads on </a:t>
+            </a:r>
+            <a:r>
+              <a:rPr lang="en-CA" dirty="0" err="1" smtClean="0"/>
+              <a:t>iphone</a:t>
+            </a:r>
+            <a:r>
+              <a:rPr lang="en-CA" dirty="0" smtClean="0"/>
+              <a:t> in December 2018</a:t>
+            </a:r>
+            <a:endParaRPr lang="en-CA" dirty="0"/>
+          </a:p>
+        </p:txBody>
+      </p:sp>
+    </p:spTree>
+    <p:extLst>
+      <p:ext uri="{BB962C8B-B14F-4D97-AF65-F5344CB8AC3E}">
+        <p14:creationId xmlns:p14="http://schemas.microsoft.com/office/powerpoint/2010/main" val="3216103837"/>
+      </p:ext>
+    </p:extLst>
+  </p:cSld>
+  <p:clrMapOvr>
+    <a:masterClrMapping/>
+  </p:clrMapOvr>
+  <p:timing>
+    <p:tnLst>
+      <p:par>
+        <p:cTn id="1" dur="indefinite" restart="never" nodeType="tmRoot"/>
+      </p:par>
+    </p:tnLst>
+  </p:timing>
+</p:sld>
+</file>
+
+<file path=ppt/slides/slide16.xml><?xml version="1.0" encoding="utf-8"?>
+<p:sld xmlns:a="http://schemas.openxmlformats.org/drawingml/2006/main" xmlns:r="http://schemas.openxmlformats.org/officeDocument/2006/relationships" xmlns:p="http://schemas.openxmlformats.org/presentationml/2006/main">
+  <p:cSld>
+    <p:spTree>
+      <p:nvGrpSpPr>
+        <p:cNvPr id="1" name=""/>
+        <p:cNvGrpSpPr/>
+        <p:nvPr/>
+      </p:nvGrpSpPr>
+      <p:grpSpPr>
+        <a:xfrm>
+          <a:off x="0" y="0"/>
+          <a:ext cx="0" cy="0"/>
+          <a:chOff x="0" y="0"/>
+          <a:chExt cx="0" cy="0"/>
+        </a:xfrm>
+      </p:grpSpPr>
+      <p:sp>
+        <p:nvSpPr>
+          <p:cNvPr id="2" name="Title 1"/>
+          <p:cNvSpPr>
+            <a:spLocks noGrp="1"/>
+          </p:cNvSpPr>
+          <p:nvPr>
+            <p:ph type="title"/>
+          </p:nvPr>
+        </p:nvSpPr>
+        <p:spPr/>
+        <p:txBody>
+          <a:bodyPr/>
+          <a:lstStyle/>
+          <a:p>
+            <a:r>
+              <a:rPr lang="en-CA" dirty="0" smtClean="0"/>
+              <a:t>Banking and finance</a:t>
+            </a:r>
+            <a:endParaRPr lang="en-CA" dirty="0"/>
+          </a:p>
+        </p:txBody>
+      </p:sp>
+      <p:sp>
+        <p:nvSpPr>
+          <p:cNvPr id="3" name="Content Placeholder 2"/>
+          <p:cNvSpPr>
+            <a:spLocks noGrp="1"/>
+          </p:cNvSpPr>
+          <p:nvPr>
+            <p:ph idx="1"/>
+          </p:nvPr>
+        </p:nvSpPr>
+        <p:spPr/>
+        <p:txBody>
+          <a:bodyPr>
+            <a:normAutofit fontScale="70000" lnSpcReduction="20000"/>
+          </a:bodyPr>
+          <a:lstStyle/>
+          <a:p>
+            <a:r>
+              <a:rPr lang="en-CA" dirty="0" smtClean="0"/>
+              <a:t>3.4 billion downloads of finance apps in 2018, up 75% from 2016</a:t>
+            </a:r>
+          </a:p>
+          <a:p>
+            <a:r>
+              <a:rPr lang="en-CA" dirty="0" smtClean="0"/>
+              <a:t>Brazil, </a:t>
+            </a:r>
+            <a:r>
+              <a:rPr lang="en-CA" dirty="0"/>
+              <a:t>I</a:t>
+            </a:r>
+            <a:r>
+              <a:rPr lang="en-CA" dirty="0" smtClean="0"/>
+              <a:t>ndia, Indonesia saw strongest growth</a:t>
+            </a:r>
+          </a:p>
+          <a:p>
+            <a:r>
+              <a:rPr lang="en-CA" dirty="0" smtClean="0"/>
+              <a:t>Banking and </a:t>
+            </a:r>
+            <a:r>
+              <a:rPr lang="en-CA" dirty="0"/>
+              <a:t>F</a:t>
+            </a:r>
+            <a:r>
+              <a:rPr lang="en-CA" dirty="0" smtClean="0"/>
+              <a:t>intech</a:t>
+            </a:r>
+          </a:p>
+          <a:p>
+            <a:r>
+              <a:rPr lang="en-CA" dirty="0" smtClean="0"/>
+              <a:t>Democratization of </a:t>
+            </a:r>
+            <a:r>
+              <a:rPr lang="en-CA" dirty="0" err="1" smtClean="0"/>
+              <a:t>fintech</a:t>
+            </a:r>
+            <a:r>
+              <a:rPr lang="en-CA" dirty="0" smtClean="0"/>
+              <a:t> services </a:t>
+            </a:r>
+          </a:p>
+          <a:p>
+            <a:pPr lvl="1"/>
+            <a:r>
+              <a:rPr lang="en-CA" dirty="0" smtClean="0"/>
+              <a:t>Investing (Acorns, </a:t>
+            </a:r>
+            <a:r>
+              <a:rPr lang="en-CA" dirty="0" err="1" smtClean="0"/>
+              <a:t>robinhood</a:t>
+            </a:r>
+            <a:r>
+              <a:rPr lang="en-CA" dirty="0" smtClean="0"/>
+              <a:t>, </a:t>
+            </a:r>
+            <a:r>
+              <a:rPr lang="en-CA" dirty="0" err="1" smtClean="0"/>
+              <a:t>wealthsimple</a:t>
+            </a:r>
+            <a:r>
+              <a:rPr lang="en-CA" dirty="0" smtClean="0"/>
+              <a:t>)</a:t>
+            </a:r>
+          </a:p>
+          <a:p>
+            <a:pPr lvl="1"/>
+            <a:r>
+              <a:rPr lang="en-CA" dirty="0" smtClean="0"/>
+              <a:t>Money transfer (</a:t>
+            </a:r>
+            <a:r>
+              <a:rPr lang="en-CA" dirty="0" err="1" smtClean="0"/>
+              <a:t>Revolut</a:t>
+            </a:r>
+            <a:r>
+              <a:rPr lang="en-CA" dirty="0" smtClean="0"/>
+              <a:t>)</a:t>
+            </a:r>
+          </a:p>
+          <a:p>
+            <a:pPr lvl="1"/>
+            <a:r>
+              <a:rPr lang="en-CA" dirty="0" smtClean="0"/>
+              <a:t>Consumer loans (</a:t>
+            </a:r>
+            <a:r>
+              <a:rPr lang="en-CA" dirty="0" err="1" smtClean="0"/>
+              <a:t>kredivo</a:t>
+            </a:r>
+            <a:r>
+              <a:rPr lang="en-CA" dirty="0" smtClean="0"/>
+              <a:t>)</a:t>
+            </a:r>
+          </a:p>
+          <a:p>
+            <a:pPr lvl="1"/>
+            <a:r>
+              <a:rPr lang="en-CA" dirty="0" smtClean="0"/>
+              <a:t>Microloans (</a:t>
+            </a:r>
+            <a:r>
+              <a:rPr lang="en-CA" dirty="0" err="1" smtClean="0"/>
+              <a:t>afterpay</a:t>
+            </a:r>
+            <a:r>
+              <a:rPr lang="en-CA" dirty="0" smtClean="0"/>
+              <a:t>) (Credit card alternatives)</a:t>
+            </a:r>
+          </a:p>
+          <a:p>
+            <a:r>
+              <a:rPr lang="en-CA" dirty="0" smtClean="0"/>
+              <a:t>Average user checks bank account 1x per day (up 35% from 2016)</a:t>
+            </a:r>
+          </a:p>
+          <a:p>
+            <a:r>
+              <a:rPr lang="en-CA" dirty="0" smtClean="0"/>
+              <a:t>Retail banking apps topped average monthly active users (MAU) chart</a:t>
+            </a:r>
+          </a:p>
+          <a:p>
+            <a:r>
+              <a:rPr lang="en-CA" dirty="0" err="1" smtClean="0"/>
+              <a:t>Revolut</a:t>
+            </a:r>
+            <a:r>
+              <a:rPr lang="en-CA" dirty="0" smtClean="0"/>
+              <a:t> secured European banking license in 2018</a:t>
+            </a:r>
+          </a:p>
+          <a:p>
+            <a:pPr lvl="1"/>
+            <a:r>
+              <a:rPr lang="en-CA" dirty="0" smtClean="0"/>
+              <a:t>Plans to open chequing/saving accounts and retail/business lending options</a:t>
+            </a:r>
+          </a:p>
+          <a:p>
+            <a:r>
+              <a:rPr lang="en-CA" dirty="0" smtClean="0"/>
+              <a:t>Paying by phone QR code becoming common, (</a:t>
+            </a:r>
+            <a:r>
+              <a:rPr lang="en-CA" dirty="0" err="1" smtClean="0"/>
+              <a:t>PayPay</a:t>
+            </a:r>
+            <a:r>
+              <a:rPr lang="en-CA" dirty="0" smtClean="0"/>
+              <a:t> in japan) (convenient and frictionless)</a:t>
+            </a:r>
+            <a:endParaRPr lang="en-CA" dirty="0"/>
+          </a:p>
+        </p:txBody>
+      </p:sp>
+    </p:spTree>
+    <p:extLst>
+      <p:ext uri="{BB962C8B-B14F-4D97-AF65-F5344CB8AC3E}">
+        <p14:creationId xmlns:p14="http://schemas.microsoft.com/office/powerpoint/2010/main" val="100324331"/>
+      </p:ext>
+    </p:extLst>
+  </p:cSld>
+  <p:clrMapOvr>
+    <a:masterClrMapping/>
+  </p:clrMapOvr>
+  <p:timing>
+    <p:tnLst>
+      <p:par>
+        <p:cTn id="1" dur="indefinite" restart="never" nodeType="tmRoot"/>
+      </p:par>
+    </p:tnLst>
+  </p:timing>
+</p:sld>
+</file>
+
+<file path=ppt/slides/slide17.xml><?xml version="1.0" encoding="utf-8"?>
+<p:sld xmlns:a="http://schemas.openxmlformats.org/drawingml/2006/main" xmlns:r="http://schemas.openxmlformats.org/officeDocument/2006/relationships" xmlns:p="http://schemas.openxmlformats.org/presentationml/2006/main">
+  <p:cSld>
+    <p:spTree>
+      <p:nvGrpSpPr>
+        <p:cNvPr id="1" name=""/>
+        <p:cNvGrpSpPr/>
+        <p:nvPr/>
+      </p:nvGrpSpPr>
+      <p:grpSpPr>
+        <a:xfrm>
+          <a:off x="0" y="0"/>
+          <a:ext cx="0" cy="0"/>
+          <a:chOff x="0" y="0"/>
+          <a:chExt cx="0" cy="0"/>
+        </a:xfrm>
+      </p:grpSpPr>
+      <p:sp>
+        <p:nvSpPr>
+          <p:cNvPr id="2" name="Title 1"/>
+          <p:cNvSpPr>
+            <a:spLocks noGrp="1"/>
+          </p:cNvSpPr>
+          <p:nvPr>
+            <p:ph type="title"/>
+          </p:nvPr>
+        </p:nvSpPr>
+        <p:spPr/>
+        <p:txBody>
+          <a:bodyPr/>
+          <a:lstStyle/>
+          <a:p>
+            <a:r>
+              <a:rPr lang="en-CA" dirty="0" smtClean="0"/>
+              <a:t>Video streaming</a:t>
+            </a:r>
+            <a:endParaRPr lang="en-CA" dirty="0"/>
+          </a:p>
+        </p:txBody>
+      </p:sp>
+      <p:sp>
+        <p:nvSpPr>
+          <p:cNvPr id="3" name="Content Placeholder 2"/>
+          <p:cNvSpPr>
+            <a:spLocks noGrp="1"/>
+          </p:cNvSpPr>
+          <p:nvPr>
+            <p:ph idx="1"/>
+          </p:nvPr>
+        </p:nvSpPr>
+        <p:spPr>
+          <a:xfrm>
+            <a:off x="838200" y="1825624"/>
+            <a:ext cx="5476875" cy="5032375"/>
+          </a:xfrm>
+        </p:spPr>
+        <p:txBody>
+          <a:bodyPr>
+            <a:normAutofit fontScale="70000" lnSpcReduction="20000"/>
+          </a:bodyPr>
+          <a:lstStyle/>
+          <a:p>
+            <a:r>
+              <a:rPr lang="en-CA" dirty="0" smtClean="0"/>
+              <a:t>&gt;100% growth in 8 major countries for time spent in top 5 video streaming apps</a:t>
+            </a:r>
+          </a:p>
+          <a:p>
+            <a:r>
+              <a:rPr lang="en-CA" dirty="0" smtClean="0"/>
+              <a:t>Consumption switching from desktop/</a:t>
+            </a:r>
+            <a:r>
+              <a:rPr lang="en-CA" dirty="0" err="1" smtClean="0"/>
+              <a:t>tv</a:t>
+            </a:r>
+            <a:r>
+              <a:rPr lang="en-CA" dirty="0" smtClean="0"/>
+              <a:t> to mobile</a:t>
+            </a:r>
+          </a:p>
+          <a:p>
+            <a:r>
+              <a:rPr lang="en-CA" dirty="0" err="1" smtClean="0"/>
+              <a:t>Youtube</a:t>
+            </a:r>
+            <a:r>
+              <a:rPr lang="en-CA" dirty="0" smtClean="0"/>
+              <a:t> dominates video streaming apps (9 of every 10 minutes streamed was from </a:t>
+            </a:r>
+            <a:r>
+              <a:rPr lang="en-CA" dirty="0" err="1" smtClean="0"/>
+              <a:t>youtube</a:t>
+            </a:r>
+            <a:r>
+              <a:rPr lang="en-CA" dirty="0" smtClean="0"/>
+              <a:t>)</a:t>
+            </a:r>
+          </a:p>
+          <a:p>
+            <a:r>
+              <a:rPr lang="en-CA" dirty="0" err="1" smtClean="0"/>
+              <a:t>Youtube</a:t>
+            </a:r>
+            <a:r>
+              <a:rPr lang="en-CA" dirty="0" smtClean="0"/>
+              <a:t> kids, Twitch </a:t>
+            </a:r>
+          </a:p>
+          <a:p>
+            <a:r>
+              <a:rPr lang="en-CA" dirty="0" err="1" smtClean="0"/>
+              <a:t>Youtube</a:t>
+            </a:r>
+            <a:r>
+              <a:rPr lang="en-CA" dirty="0" smtClean="0"/>
+              <a:t> comes pre-installed</a:t>
+            </a:r>
+          </a:p>
+          <a:p>
+            <a:r>
+              <a:rPr lang="en-CA" dirty="0" smtClean="0"/>
+              <a:t>Consumer spend in video streaming apps exploded (285% worldwide increase 2018 vs 2016)</a:t>
+            </a:r>
+          </a:p>
+          <a:p>
+            <a:pPr lvl="1"/>
+            <a:r>
+              <a:rPr lang="en-CA" dirty="0" err="1" smtClean="0"/>
+              <a:t>Youtube’s</a:t>
+            </a:r>
+            <a:r>
+              <a:rPr lang="en-CA" dirty="0" smtClean="0"/>
+              <a:t> premium features</a:t>
+            </a:r>
+          </a:p>
+          <a:p>
+            <a:r>
+              <a:rPr lang="en-CA" dirty="0" smtClean="0"/>
+              <a:t>Disney+ launch in 2019</a:t>
+            </a:r>
+          </a:p>
+          <a:p>
+            <a:r>
+              <a:rPr lang="en-CA" dirty="0" smtClean="0"/>
+              <a:t>2.2 billion spent on top 5 streaming services in 2018 (Netflix #1 worldwide)</a:t>
+            </a:r>
+          </a:p>
+          <a:p>
+            <a:r>
+              <a:rPr lang="en-CA" dirty="0" smtClean="0"/>
+              <a:t>Live streaming apps (BIGO LIVE, </a:t>
+            </a:r>
+            <a:r>
+              <a:rPr lang="en-CA" dirty="0" err="1" smtClean="0"/>
+              <a:t>Nonolive</a:t>
+            </a:r>
+            <a:r>
+              <a:rPr lang="en-CA" dirty="0" smtClean="0"/>
+              <a:t>)</a:t>
+            </a:r>
+          </a:p>
+          <a:p>
+            <a:r>
+              <a:rPr lang="en-CA" dirty="0" smtClean="0"/>
+              <a:t>Sport streaming</a:t>
+            </a:r>
+          </a:p>
+        </p:txBody>
+      </p:sp>
+      <p:pic>
+        <p:nvPicPr>
+          <p:cNvPr id="4" name="Picture 3"/>
+          <p:cNvPicPr>
+            <a:picLocks noChangeAspect="1"/>
+          </p:cNvPicPr>
+          <p:nvPr/>
+        </p:nvPicPr>
+        <p:blipFill>
+          <a:blip r:embed="rId2"/>
+          <a:stretch>
+            <a:fillRect/>
+          </a:stretch>
+        </p:blipFill>
+        <p:spPr>
+          <a:xfrm>
+            <a:off x="6092832" y="1925782"/>
+            <a:ext cx="6099168" cy="3588327"/>
+          </a:xfrm>
+          <a:prstGeom prst="rect">
+            <a:avLst/>
+          </a:prstGeom>
+        </p:spPr>
+      </p:pic>
+    </p:spTree>
+    <p:extLst>
+      <p:ext uri="{BB962C8B-B14F-4D97-AF65-F5344CB8AC3E}">
+        <p14:creationId xmlns:p14="http://schemas.microsoft.com/office/powerpoint/2010/main" val="1895112152"/>
+      </p:ext>
+    </p:extLst>
+  </p:cSld>
+  <p:clrMapOvr>
+    <a:masterClrMapping/>
+  </p:clrMapOvr>
+  <p:timing>
+    <p:tnLst>
+      <p:par>
+        <p:cTn id="1" dur="indefinite" restart="never" nodeType="tmRoot"/>
+      </p:par>
+    </p:tnLst>
+  </p:timing>
+</p:sld>
+</file>
+
+<file path=ppt/slides/slide18.xml><?xml version="1.0" encoding="utf-8"?>
+<p:sld xmlns:a="http://schemas.openxmlformats.org/drawingml/2006/main" xmlns:r="http://schemas.openxmlformats.org/officeDocument/2006/relationships" xmlns:p="http://schemas.openxmlformats.org/presentationml/2006/main">
+  <p:cSld>
+    <p:spTree>
+      <p:nvGrpSpPr>
+        <p:cNvPr id="1" name=""/>
+        <p:cNvGrpSpPr/>
+        <p:nvPr/>
+      </p:nvGrpSpPr>
+      <p:grpSpPr>
+        <a:xfrm>
+          <a:off x="0" y="0"/>
+          <a:ext cx="0" cy="0"/>
+          <a:chOff x="0" y="0"/>
+          <a:chExt cx="0" cy="0"/>
+        </a:xfrm>
+      </p:grpSpPr>
+      <p:sp>
+        <p:nvSpPr>
+          <p:cNvPr id="2" name="Title 1"/>
+          <p:cNvSpPr>
+            <a:spLocks noGrp="1"/>
+          </p:cNvSpPr>
+          <p:nvPr>
+            <p:ph type="title"/>
+          </p:nvPr>
+        </p:nvSpPr>
+        <p:spPr/>
+        <p:txBody>
+          <a:bodyPr/>
+          <a:lstStyle/>
+          <a:p>
+            <a:r>
+              <a:rPr lang="en-CA" dirty="0" smtClean="0"/>
+              <a:t>Social networking and messaging</a:t>
+            </a:r>
+            <a:endParaRPr lang="en-CA" dirty="0"/>
+          </a:p>
+        </p:txBody>
+      </p:sp>
+      <p:sp>
+        <p:nvSpPr>
+          <p:cNvPr id="3" name="Content Placeholder 2"/>
+          <p:cNvSpPr>
+            <a:spLocks noGrp="1"/>
+          </p:cNvSpPr>
+          <p:nvPr>
+            <p:ph idx="1"/>
+          </p:nvPr>
+        </p:nvSpPr>
+        <p:spPr>
+          <a:xfrm>
+            <a:off x="304800" y="1357746"/>
+            <a:ext cx="5514109" cy="5500254"/>
+          </a:xfrm>
+        </p:spPr>
+        <p:txBody>
+          <a:bodyPr>
+            <a:normAutofit fontScale="62500" lnSpcReduction="20000"/>
+          </a:bodyPr>
+          <a:lstStyle/>
+          <a:p>
+            <a:r>
+              <a:rPr lang="en-CA" dirty="0" smtClean="0"/>
+              <a:t>685 billion hours spent globally in social/messaging apps in 2018, up 35% from 2016</a:t>
+            </a:r>
+          </a:p>
+          <a:p>
+            <a:r>
+              <a:rPr lang="en-CA" dirty="0" smtClean="0"/>
+              <a:t>Half of time spent on mobile globally is in social/messaging</a:t>
+            </a:r>
+          </a:p>
+          <a:p>
+            <a:r>
+              <a:rPr lang="en-CA" dirty="0" smtClean="0"/>
+              <a:t>Video is an expected feature for many social/messaging apps</a:t>
+            </a:r>
+          </a:p>
+          <a:p>
+            <a:pPr lvl="1"/>
+            <a:r>
+              <a:rPr lang="en-CA" dirty="0" smtClean="0"/>
+              <a:t>Live streaming, video calling, viewing short-form video clips</a:t>
+            </a:r>
+          </a:p>
+          <a:p>
+            <a:r>
+              <a:rPr lang="en-CA" dirty="0" smtClean="0"/>
+              <a:t>Instagram, snapchat, </a:t>
+            </a:r>
+            <a:r>
+              <a:rPr lang="en-CA" dirty="0" err="1" smtClean="0"/>
+              <a:t>tik</a:t>
+            </a:r>
+            <a:r>
+              <a:rPr lang="en-CA" dirty="0" smtClean="0"/>
+              <a:t> </a:t>
+            </a:r>
+            <a:r>
+              <a:rPr lang="en-CA" dirty="0" err="1" smtClean="0"/>
+              <a:t>tok</a:t>
+            </a:r>
+            <a:r>
+              <a:rPr lang="en-CA" dirty="0" smtClean="0"/>
+              <a:t> foster deep engagement for generation z</a:t>
+            </a:r>
+          </a:p>
+          <a:p>
+            <a:r>
+              <a:rPr lang="en-CA" dirty="0" err="1" smtClean="0"/>
+              <a:t>Whatsapp</a:t>
+            </a:r>
+            <a:r>
+              <a:rPr lang="en-CA" dirty="0" smtClean="0"/>
+              <a:t> was top social/messaging app for user engagement</a:t>
+            </a:r>
+          </a:p>
+          <a:p>
+            <a:pPr lvl="1"/>
+            <a:r>
+              <a:rPr lang="en-CA" dirty="0" smtClean="0"/>
+              <a:t>demand for free calls and messages</a:t>
+            </a:r>
+          </a:p>
+          <a:p>
+            <a:pPr lvl="1"/>
+            <a:r>
+              <a:rPr lang="en-CA" dirty="0" smtClean="0"/>
+              <a:t>Simple UI, ease of use for adding contacts</a:t>
+            </a:r>
+          </a:p>
+          <a:p>
+            <a:pPr lvl="1"/>
+            <a:r>
+              <a:rPr lang="en-CA" dirty="0" smtClean="0"/>
+              <a:t>Encrypted messaging</a:t>
+            </a:r>
+          </a:p>
+          <a:p>
+            <a:pPr lvl="1"/>
+            <a:r>
+              <a:rPr lang="en-CA" dirty="0" smtClean="0"/>
+              <a:t>higher MAU than Facebook</a:t>
+            </a:r>
+          </a:p>
+          <a:p>
+            <a:r>
+              <a:rPr lang="en-CA" dirty="0" smtClean="0"/>
+              <a:t>Snapchat 2</a:t>
+            </a:r>
+            <a:r>
+              <a:rPr lang="en-CA" baseline="30000" dirty="0" smtClean="0"/>
+              <a:t>nd</a:t>
+            </a:r>
+            <a:r>
+              <a:rPr lang="en-CA" dirty="0" smtClean="0"/>
+              <a:t> place for user engagement </a:t>
+            </a:r>
+          </a:p>
+          <a:p>
+            <a:pPr lvl="1"/>
+            <a:r>
+              <a:rPr lang="en-CA" dirty="0" smtClean="0"/>
+              <a:t>Photos/videos important for modern communication</a:t>
+            </a:r>
+          </a:p>
+          <a:p>
+            <a:r>
+              <a:rPr lang="en-CA" dirty="0" smtClean="0"/>
+              <a:t>Instagram users up 35% from 2017 to 2018</a:t>
+            </a:r>
+          </a:p>
+          <a:p>
+            <a:r>
+              <a:rPr lang="en-CA" dirty="0" smtClean="0"/>
+              <a:t>Users don’t seem to care about privacy (</a:t>
+            </a:r>
+            <a:r>
+              <a:rPr lang="en-CA" dirty="0" err="1" smtClean="0"/>
+              <a:t>facebook</a:t>
+            </a:r>
+            <a:r>
+              <a:rPr lang="en-CA" dirty="0" smtClean="0"/>
+              <a:t> scandals)</a:t>
+            </a:r>
+          </a:p>
+          <a:p>
+            <a:endParaRPr lang="en-CA" dirty="0" smtClean="0"/>
+          </a:p>
+          <a:p>
+            <a:pPr lvl="1"/>
+            <a:endParaRPr lang="en-CA" dirty="0"/>
+          </a:p>
+        </p:txBody>
+      </p:sp>
+      <p:pic>
+        <p:nvPicPr>
+          <p:cNvPr id="4" name="Picture 3"/>
+          <p:cNvPicPr>
+            <a:picLocks noChangeAspect="1"/>
+          </p:cNvPicPr>
+          <p:nvPr/>
+        </p:nvPicPr>
+        <p:blipFill>
+          <a:blip r:embed="rId2"/>
+          <a:stretch>
+            <a:fillRect/>
+          </a:stretch>
+        </p:blipFill>
+        <p:spPr>
+          <a:xfrm>
+            <a:off x="6372225" y="2106757"/>
+            <a:ext cx="5819775" cy="4543425"/>
+          </a:xfrm>
+          <a:prstGeom prst="rect">
+            <a:avLst/>
+          </a:prstGeom>
+        </p:spPr>
+      </p:pic>
+    </p:spTree>
+    <p:extLst>
+      <p:ext uri="{BB962C8B-B14F-4D97-AF65-F5344CB8AC3E}">
+        <p14:creationId xmlns:p14="http://schemas.microsoft.com/office/powerpoint/2010/main" val="3422540986"/>
+      </p:ext>
+    </p:extLst>
+  </p:cSld>
+  <p:clrMapOvr>
+    <a:masterClrMapping/>
+  </p:clrMapOvr>
+  <p:timing>
+    <p:tnLst>
+      <p:par>
+        <p:cTn id="1" dur="indefinite" restart="never" nodeType="tmRoot"/>
+      </p:par>
+    </p:tnLst>
+  </p:timing>
+</p:sld>
+</file>
+
+<file path=ppt/slides/slide19.xml><?xml version="1.0" encoding="utf-8"?>
+<p:sld xmlns:a="http://schemas.openxmlformats.org/drawingml/2006/main" xmlns:r="http://schemas.openxmlformats.org/officeDocument/2006/relationships" xmlns:p="http://schemas.openxmlformats.org/presentationml/2006/main">
+  <p:cSld>
+    <p:spTree>
+      <p:nvGrpSpPr>
+        <p:cNvPr id="1" name=""/>
+        <p:cNvGrpSpPr/>
+        <p:nvPr/>
+      </p:nvGrpSpPr>
+      <p:grpSpPr>
+        <a:xfrm>
+          <a:off x="0" y="0"/>
+          <a:ext cx="0" cy="0"/>
+          <a:chOff x="0" y="0"/>
+          <a:chExt cx="0" cy="0"/>
+        </a:xfrm>
+      </p:grpSpPr>
+      <p:sp>
+        <p:nvSpPr>
+          <p:cNvPr id="2" name="Title 1"/>
+          <p:cNvSpPr>
+            <a:spLocks noGrp="1"/>
+          </p:cNvSpPr>
+          <p:nvPr>
+            <p:ph type="title"/>
+          </p:nvPr>
+        </p:nvSpPr>
+        <p:spPr/>
+        <p:txBody>
+          <a:bodyPr/>
+          <a:lstStyle/>
+          <a:p>
+            <a:r>
+              <a:rPr lang="en-CA" dirty="0"/>
+              <a:t>T</a:t>
+            </a:r>
+            <a:r>
+              <a:rPr lang="en-CA" dirty="0" smtClean="0"/>
+              <a:t>ravel</a:t>
+            </a:r>
+            <a:endParaRPr lang="en-CA" dirty="0"/>
+          </a:p>
+        </p:txBody>
+      </p:sp>
+      <p:sp>
+        <p:nvSpPr>
+          <p:cNvPr id="3" name="Content Placeholder 2"/>
+          <p:cNvSpPr>
+            <a:spLocks noGrp="1"/>
+          </p:cNvSpPr>
+          <p:nvPr>
+            <p:ph idx="1"/>
+          </p:nvPr>
+        </p:nvSpPr>
+        <p:spPr/>
+        <p:txBody>
+          <a:bodyPr/>
+          <a:lstStyle/>
+          <a:p>
+            <a:r>
+              <a:rPr lang="en-CA" dirty="0" smtClean="0"/>
+              <a:t>Number of sessions in travel/navigation apps up 50% 2016 to 2018</a:t>
+            </a:r>
+          </a:p>
+          <a:p>
+            <a:r>
+              <a:rPr lang="en-CA" dirty="0" smtClean="0"/>
+              <a:t>Google Maps, </a:t>
+            </a:r>
+            <a:r>
+              <a:rPr lang="en-CA" dirty="0"/>
+              <a:t>U</a:t>
+            </a:r>
+            <a:r>
+              <a:rPr lang="en-CA" dirty="0" smtClean="0"/>
+              <a:t>ber, Airbnb	</a:t>
+            </a:r>
+          </a:p>
+          <a:p>
+            <a:r>
+              <a:rPr lang="en-CA" dirty="0" smtClean="0"/>
+              <a:t>Car sharing apps up 25% year over year in 2018</a:t>
+            </a:r>
+          </a:p>
+          <a:p>
+            <a:r>
+              <a:rPr lang="en-CA" dirty="0" smtClean="0"/>
+              <a:t>Bike and scooter sharing apps breakout (up 530%) in 2018 vs 2017</a:t>
+            </a:r>
+          </a:p>
+          <a:p>
+            <a:pPr lvl="1"/>
+            <a:r>
+              <a:rPr lang="en-CA" dirty="0" smtClean="0"/>
+              <a:t>Still in early phases (Bird and Lime)</a:t>
+            </a:r>
+          </a:p>
+          <a:p>
+            <a:r>
+              <a:rPr lang="en-CA" dirty="0" smtClean="0"/>
+              <a:t>Top 5 airline apps grew 55% from 2016 to 2018</a:t>
+            </a:r>
+          </a:p>
+          <a:p>
+            <a:pPr lvl="1"/>
+            <a:r>
+              <a:rPr lang="en-CA" dirty="0" smtClean="0"/>
+              <a:t>Apps allow airlines to establish direct relationship with customers, this connection has been undermined by travel aggregators in recent years</a:t>
+            </a:r>
+          </a:p>
+          <a:p>
+            <a:pPr lvl="1"/>
+            <a:endParaRPr lang="en-CA" dirty="0"/>
+          </a:p>
+        </p:txBody>
+      </p:sp>
+    </p:spTree>
+    <p:extLst>
+      <p:ext uri="{BB962C8B-B14F-4D97-AF65-F5344CB8AC3E}">
+        <p14:creationId xmlns:p14="http://schemas.microsoft.com/office/powerpoint/2010/main" val="1668211798"/>
+      </p:ext>
+    </p:extLst>
+  </p:cSld>
+  <p:clrMapOvr>
+    <a:masterClrMapping/>
+  </p:clrMapOvr>
+  <p:timing>
+    <p:tnLst>
+      <p:par>
+        <p:cTn id="1" dur="indefinite" restart="never" nodeType="tmRoot"/>
+      </p:par>
+    </p:tnLst>
+  </p:timing>
 </p:sld>
 </file>
 
@@ -3076,7 +4840,7 @@
           <a:p>
             <a:r>
               <a:rPr lang="en-CA" dirty="0" smtClean="0"/>
-              <a:t>Resources:</a:t>
+              <a:t>Lecture outline</a:t>
             </a:r>
             <a:endParaRPr lang="en-CA" dirty="0"/>
           </a:p>
@@ -3098,73 +4862,39 @@
           <a:lstStyle/>
           <a:p>
             <a:r>
-              <a:rPr lang="en-CA" dirty="0"/>
-              <a:t>Android developer conference (this October</a:t>
-            </a:r>
-            <a:r>
-              <a:rPr lang="en-CA" dirty="0" smtClean="0"/>
-              <a:t>)</a:t>
-            </a:r>
-            <a:endParaRPr lang="en-CA" dirty="0" smtClean="0">
-              <a:hlinkClick r:id="rId2"/>
+              <a:rPr lang="en-CA" dirty="0" smtClean="0"/>
+              <a:t>Mobile landscape</a:t>
+            </a:r>
+          </a:p>
+          <a:p>
+            <a:r>
+              <a:rPr lang="en-CA" dirty="0" smtClean="0"/>
+              <a:t>My apps</a:t>
+            </a:r>
+          </a:p>
+          <a:p>
+            <a:r>
+              <a:rPr lang="en-CA" dirty="0" smtClean="0"/>
+              <a:t>First project: </a:t>
+            </a:r>
+            <a:r>
+              <a:rPr lang="en-CA" b="1" dirty="0" err="1" smtClean="0">
+                <a:solidFill>
+                  <a:srgbClr val="7030A0"/>
+                </a:solidFill>
+              </a:rPr>
+              <a:t>Gaitergram</a:t>
+            </a:r>
+            <a:endParaRPr lang="en-CA" b="1" dirty="0" smtClean="0">
+              <a:solidFill>
+                <a:srgbClr val="7030A0"/>
+              </a:solidFill>
             </a:endParaRPr>
           </a:p>
           <a:p>
-            <a:r>
-              <a:rPr lang="en-CA" dirty="0" smtClean="0">
-                <a:hlinkClick r:id="rId2"/>
-              </a:rPr>
-              <a:t>https</a:t>
-            </a:r>
-            <a:r>
-              <a:rPr lang="en-CA" dirty="0">
-                <a:hlinkClick r:id="rId2"/>
-              </a:rPr>
-              <a:t>://</a:t>
-            </a:r>
-            <a:r>
-              <a:rPr lang="en-CA" dirty="0" smtClean="0">
-                <a:hlinkClick r:id="rId2"/>
-              </a:rPr>
-              <a:t>developer.android.com/dev-summit</a:t>
-            </a:r>
             <a:endParaRPr lang="en-CA" dirty="0" smtClean="0"/>
           </a:p>
           <a:p>
-            <a:r>
-              <a:rPr lang="en-CA" dirty="0" smtClean="0"/>
-              <a:t>Android developer guide:</a:t>
-            </a:r>
-            <a:endParaRPr lang="en-CA" dirty="0"/>
-          </a:p>
-          <a:p>
-            <a:r>
-              <a:rPr lang="en-CA" dirty="0">
-                <a:hlinkClick r:id="rId3"/>
-              </a:rPr>
-              <a:t>https://</a:t>
-            </a:r>
-            <a:r>
-              <a:rPr lang="en-CA" dirty="0" smtClean="0">
-                <a:hlinkClick r:id="rId3"/>
-              </a:rPr>
-              <a:t>developer.android.com/guide</a:t>
-            </a:r>
-            <a:endParaRPr lang="en-CA" dirty="0" smtClean="0"/>
-          </a:p>
-          <a:p>
-            <a:r>
-              <a:rPr lang="en-CA" dirty="0" smtClean="0"/>
-              <a:t>Android developer documentation</a:t>
-            </a:r>
-          </a:p>
-          <a:p>
-            <a:r>
-              <a:rPr lang="en-CA" dirty="0">
-                <a:hlinkClick r:id="rId4"/>
-              </a:rPr>
-              <a:t>https://developer.android.com/docs</a:t>
-            </a:r>
             <a:endParaRPr lang="en-CA" dirty="0"/>
           </a:p>
         </p:txBody>
@@ -3172,17 +4902,24 @@
     </p:spTree>
     <p:extLst>
       <p:ext uri="{BB962C8B-B14F-4D97-AF65-F5344CB8AC3E}">
-        <p14:creationId xmlns:p14="http://schemas.microsoft.com/office/powerpoint/2010/main" val="3371915275"/>
+        <p14:creationId xmlns:p14="http://schemas.microsoft.com/office/powerpoint/2010/main" val="3170122911"/>
       </p:ext>
     </p:extLst>
   </p:cSld>
   <p:clrMapOvr>
     <a:masterClrMapping/>
   </p:clrMapOvr>
+  <p:timing>
+    <p:tnLst>
+      <p:par>
+        <p:cTn id="1" dur="indefinite" restart="never" nodeType="tmRoot"/>
+      </p:par>
+    </p:tnLst>
+  </p:timing>
 </p:sld>
 </file>
 
-<file path=ppt/slides/slide3.xml><?xml version="1.0" encoding="utf-8"?>
+<file path=ppt/slides/slide20.xml><?xml version="1.0" encoding="utf-8"?>
 <p:sld xmlns:a="http://schemas.openxmlformats.org/drawingml/2006/main" xmlns:r="http://schemas.openxmlformats.org/officeDocument/2006/relationships" xmlns:p="http://schemas.openxmlformats.org/presentationml/2006/main">
   <p:cSld>
     <p:spTree>
@@ -3216,7 +4953,7 @@
           <a:p>
             <a:r>
               <a:rPr lang="en-CA" dirty="0" smtClean="0"/>
-              <a:t>Prerequisites and goals</a:t>
+              <a:t>Other industries</a:t>
             </a:r>
             <a:endParaRPr lang="en-CA" dirty="0"/>
           </a:p>
@@ -3232,32 +4969,48 @@
             <p:ph idx="1"/>
           </p:nvPr>
         </p:nvSpPr>
-        <p:spPr>
-          <a:xfrm>
-            <a:off x="838199" y="1950316"/>
-            <a:ext cx="11090565" cy="4351338"/>
-          </a:xfrm>
-        </p:spPr>
-        <p:txBody>
-          <a:bodyPr/>
-          <a:lstStyle/>
-          <a:p>
-            <a:r>
-              <a:rPr lang="en-CA" dirty="0" smtClean="0"/>
-              <a:t>Familiarity with at least one object-oriented programming language (preferably java or C++)</a:t>
-            </a:r>
-          </a:p>
-          <a:p>
-            <a:r>
-              <a:rPr lang="en-CA" dirty="0" smtClean="0"/>
-              <a:t>Should recognize the following terms: </a:t>
-            </a:r>
-            <a:r>
-              <a:rPr lang="en-CA" i="1" dirty="0" smtClean="0"/>
-              <a:t>class, constructor, interface, getter, setter, generic types</a:t>
-            </a:r>
-          </a:p>
-          <a:p>
+        <p:spPr/>
+        <p:txBody>
+          <a:bodyPr/>
+          <a:lstStyle/>
+          <a:p>
+            <a:r>
+              <a:rPr lang="en-CA" dirty="0" smtClean="0"/>
+              <a:t>Dating apps – $400million to $1.4 billion or 190% increase in consumer spend (Subscriptions) from 2016 to 2018, led by Tinder</a:t>
+            </a:r>
+          </a:p>
+          <a:p>
+            <a:r>
+              <a:rPr lang="en-CA" dirty="0" smtClean="0"/>
+              <a:t>Unique dating apps (Bumble, women initiate first message) </a:t>
+            </a:r>
+          </a:p>
+          <a:p>
+            <a:r>
+              <a:rPr lang="en-CA" dirty="0" smtClean="0"/>
+              <a:t>Global spend in health/fitness apps up 300% from 2016 to 2018</a:t>
+            </a:r>
+          </a:p>
+          <a:p>
+            <a:pPr lvl="1"/>
+            <a:r>
+              <a:rPr lang="en-CA" dirty="0" err="1" smtClean="0"/>
+              <a:t>Myfitnesspal</a:t>
+            </a:r>
+            <a:endParaRPr lang="en-CA" dirty="0" smtClean="0"/>
+          </a:p>
+          <a:p>
+            <a:pPr lvl="1"/>
+            <a:r>
+              <a:rPr lang="en-CA" dirty="0" smtClean="0"/>
+              <a:t>Meditation apps, culture shift towards wellness</a:t>
+            </a:r>
+          </a:p>
+          <a:p>
+            <a:r>
+              <a:rPr lang="en-CA" dirty="0" smtClean="0"/>
+              <a:t>Video calling doctors</a:t>
+            </a:r>
             <a:endParaRPr lang="en-CA" dirty="0"/>
           </a:p>
         </p:txBody>
@@ -3265,17 +5018,24 @@
     </p:spTree>
     <p:extLst>
       <p:ext uri="{BB962C8B-B14F-4D97-AF65-F5344CB8AC3E}">
-        <p14:creationId xmlns:p14="http://schemas.microsoft.com/office/powerpoint/2010/main" val="2313153903"/>
+        <p14:creationId xmlns:p14="http://schemas.microsoft.com/office/powerpoint/2010/main" val="2460831535"/>
       </p:ext>
     </p:extLst>
   </p:cSld>
   <p:clrMapOvr>
     <a:masterClrMapping/>
   </p:clrMapOvr>
+  <p:timing>
+    <p:tnLst>
+      <p:par>
+        <p:cTn id="1" dur="indefinite" restart="never" nodeType="tmRoot"/>
+      </p:par>
+    </p:tnLst>
+  </p:timing>
 </p:sld>
 </file>
 
-<file path=ppt/slides/slide4.xml><?xml version="1.0" encoding="utf-8"?>
+<file path=ppt/slides/slide21.xml><?xml version="1.0" encoding="utf-8"?>
 <p:sld xmlns:a="http://schemas.openxmlformats.org/drawingml/2006/main" xmlns:r="http://schemas.openxmlformats.org/officeDocument/2006/relationships" xmlns:p="http://schemas.openxmlformats.org/presentationml/2006/main">
   <p:cSld>
     <p:spTree>
@@ -3309,6 +5069,1057 @@
           <a:p>
             <a:r>
               <a:rPr lang="en-CA" dirty="0" smtClean="0"/>
+              <a:t>2019 predictions</a:t>
+            </a:r>
+            <a:endParaRPr lang="en-CA" dirty="0"/>
+          </a:p>
+        </p:txBody>
+      </p:sp>
+      <p:sp>
+        <p:nvSpPr>
+          <p:cNvPr id="3" name="Content Placeholder 2"/>
+          <p:cNvSpPr>
+            <a:spLocks noGrp="1"/>
+          </p:cNvSpPr>
+          <p:nvPr>
+            <p:ph idx="1"/>
+          </p:nvPr>
+        </p:nvSpPr>
+        <p:spPr/>
+        <p:txBody>
+          <a:bodyPr>
+            <a:normAutofit fontScale="92500" lnSpcReduction="10000"/>
+          </a:bodyPr>
+          <a:lstStyle/>
+          <a:p>
+            <a:r>
+              <a:rPr lang="en-CA" dirty="0" smtClean="0"/>
+              <a:t>App store consumer spend will surpass $120 billion in 2019 </a:t>
+            </a:r>
+          </a:p>
+          <a:p>
+            <a:pPr lvl="1"/>
+            <a:r>
+              <a:rPr lang="en-CA" dirty="0" smtClean="0"/>
+              <a:t>double the global box office market</a:t>
+            </a:r>
+          </a:p>
+          <a:p>
+            <a:pPr lvl="1"/>
+            <a:r>
+              <a:rPr lang="en-CA" dirty="0" smtClean="0"/>
+              <a:t>growing 5x rate of global economy</a:t>
+            </a:r>
+          </a:p>
+          <a:p>
+            <a:r>
+              <a:rPr lang="en-CA" dirty="0" smtClean="0"/>
+              <a:t>Gaming: mobile will grow to 60% of global gaming market share </a:t>
+            </a:r>
+          </a:p>
+          <a:p>
+            <a:pPr lvl="1"/>
+            <a:r>
+              <a:rPr lang="en-CA" dirty="0" err="1" smtClean="0"/>
+              <a:t>Fortnite</a:t>
+            </a:r>
+            <a:r>
+              <a:rPr lang="en-CA" dirty="0" smtClean="0"/>
+              <a:t>/PUBG combined with powerful devices </a:t>
+            </a:r>
+          </a:p>
+          <a:p>
+            <a:pPr lvl="1"/>
+            <a:r>
+              <a:rPr lang="en-CA" dirty="0" err="1" smtClean="0"/>
+              <a:t>Hypercasual</a:t>
+            </a:r>
+            <a:r>
+              <a:rPr lang="en-CA" dirty="0" smtClean="0"/>
+              <a:t> games with simple gameplay</a:t>
+            </a:r>
+          </a:p>
+          <a:p>
+            <a:pPr lvl="1"/>
+            <a:r>
+              <a:rPr lang="en-CA" dirty="0" err="1" smtClean="0"/>
+              <a:t>Pokemon</a:t>
+            </a:r>
+            <a:r>
+              <a:rPr lang="en-CA" dirty="0" smtClean="0"/>
+              <a:t> Go (first game past $1 billion, at ~$3 billion today) </a:t>
+            </a:r>
+          </a:p>
+          <a:p>
+            <a:r>
+              <a:rPr lang="fr-CA" dirty="0" smtClean="0"/>
+              <a:t>10 minutes of </a:t>
+            </a:r>
+            <a:r>
+              <a:rPr lang="fr-CA" dirty="0" err="1" smtClean="0"/>
+              <a:t>every</a:t>
+            </a:r>
+            <a:r>
+              <a:rPr lang="fr-CA" dirty="0" smtClean="0"/>
+              <a:t> </a:t>
+            </a:r>
+            <a:r>
+              <a:rPr lang="fr-CA" dirty="0" err="1" smtClean="0"/>
+              <a:t>hour</a:t>
+            </a:r>
+            <a:r>
+              <a:rPr lang="fr-CA" dirty="0" smtClean="0"/>
+              <a:t> </a:t>
+            </a:r>
+            <a:r>
+              <a:rPr lang="fr-CA" dirty="0" err="1" smtClean="0"/>
+              <a:t>spent</a:t>
+            </a:r>
+            <a:r>
+              <a:rPr lang="fr-CA" dirty="0" smtClean="0"/>
+              <a:t> </a:t>
+            </a:r>
+            <a:r>
+              <a:rPr lang="fr-CA" dirty="0" err="1" smtClean="0"/>
+              <a:t>co</a:t>
+            </a:r>
+            <a:r>
+              <a:rPr lang="en-CA" dirty="0" err="1" smtClean="0"/>
+              <a:t>nsuming</a:t>
+            </a:r>
+            <a:r>
+              <a:rPr lang="en-CA" dirty="0" smtClean="0"/>
+              <a:t> media in 2019 will be streaming video on mobile</a:t>
+            </a:r>
+          </a:p>
+          <a:p>
+            <a:r>
+              <a:rPr lang="en-CA" dirty="0" smtClean="0"/>
+              <a:t>60% more apps will monetize through in-app ads</a:t>
+            </a:r>
+          </a:p>
+          <a:p>
+            <a:pPr lvl="1"/>
+            <a:r>
+              <a:rPr lang="en-CA" dirty="0" smtClean="0"/>
+              <a:t>Mobile dominates digital advertising market (155 billion, or 62% of 250 billion)</a:t>
+            </a:r>
+          </a:p>
+          <a:p>
+            <a:endParaRPr lang="en-CA" dirty="0" smtClean="0"/>
+          </a:p>
+          <a:p>
+            <a:pPr marL="457200" lvl="1" indent="0">
+              <a:buNone/>
+            </a:pPr>
+            <a:endParaRPr lang="en-CA" dirty="0" smtClean="0"/>
+          </a:p>
+          <a:p>
+            <a:endParaRPr lang="en-CA" dirty="0"/>
+          </a:p>
+        </p:txBody>
+      </p:sp>
+    </p:spTree>
+    <p:extLst>
+      <p:ext uri="{BB962C8B-B14F-4D97-AF65-F5344CB8AC3E}">
+        <p14:creationId xmlns:p14="http://schemas.microsoft.com/office/powerpoint/2010/main" val="4096796357"/>
+      </p:ext>
+    </p:extLst>
+  </p:cSld>
+  <p:clrMapOvr>
+    <a:masterClrMapping/>
+  </p:clrMapOvr>
+  <p:timing>
+    <p:tnLst>
+      <p:par>
+        <p:cTn id="1" dur="indefinite" restart="never" nodeType="tmRoot"/>
+      </p:par>
+    </p:tnLst>
+  </p:timing>
+</p:sld>
+</file>
+
+<file path=ppt/slides/slide22.xml><?xml version="1.0" encoding="utf-8"?>
+<p:sld xmlns:a="http://schemas.openxmlformats.org/drawingml/2006/main" xmlns:r="http://schemas.openxmlformats.org/officeDocument/2006/relationships" xmlns:p="http://schemas.openxmlformats.org/presentationml/2006/main">
+  <p:cSld>
+    <p:spTree>
+      <p:nvGrpSpPr>
+        <p:cNvPr id="1" name=""/>
+        <p:cNvGrpSpPr/>
+        <p:nvPr/>
+      </p:nvGrpSpPr>
+      <p:grpSpPr>
+        <a:xfrm>
+          <a:off x="0" y="0"/>
+          <a:ext cx="0" cy="0"/>
+          <a:chOff x="0" y="0"/>
+          <a:chExt cx="0" cy="0"/>
+        </a:xfrm>
+      </p:grpSpPr>
+      <p:sp>
+        <p:nvSpPr>
+          <p:cNvPr id="2" name="Title 1"/>
+          <p:cNvSpPr>
+            <a:spLocks noGrp="1"/>
+          </p:cNvSpPr>
+          <p:nvPr>
+            <p:ph type="title"/>
+          </p:nvPr>
+        </p:nvSpPr>
+        <p:spPr/>
+        <p:txBody>
+          <a:bodyPr/>
+          <a:lstStyle/>
+          <a:p>
+            <a:r>
+              <a:rPr lang="en-CA" dirty="0" smtClean="0"/>
+              <a:t>Top 10 apps by monthly active users worldwide</a:t>
+            </a:r>
+            <a:endParaRPr lang="en-CA" dirty="0"/>
+          </a:p>
+        </p:txBody>
+      </p:sp>
+      <p:pic>
+        <p:nvPicPr>
+          <p:cNvPr id="4" name="Picture 3"/>
+          <p:cNvPicPr>
+            <a:picLocks noChangeAspect="1"/>
+          </p:cNvPicPr>
+          <p:nvPr/>
+        </p:nvPicPr>
+        <p:blipFill>
+          <a:blip r:embed="rId2"/>
+          <a:stretch>
+            <a:fillRect/>
+          </a:stretch>
+        </p:blipFill>
+        <p:spPr>
+          <a:xfrm>
+            <a:off x="838200" y="2065626"/>
+            <a:ext cx="10715625" cy="4333875"/>
+          </a:xfrm>
+          <a:prstGeom prst="rect">
+            <a:avLst/>
+          </a:prstGeom>
+        </p:spPr>
+      </p:pic>
+    </p:spTree>
+    <p:extLst>
+      <p:ext uri="{BB962C8B-B14F-4D97-AF65-F5344CB8AC3E}">
+        <p14:creationId xmlns:p14="http://schemas.microsoft.com/office/powerpoint/2010/main" val="1792517888"/>
+      </p:ext>
+    </p:extLst>
+  </p:cSld>
+  <p:clrMapOvr>
+    <a:masterClrMapping/>
+  </p:clrMapOvr>
+  <p:timing>
+    <p:tnLst>
+      <p:par>
+        <p:cTn id="1" dur="indefinite" restart="never" nodeType="tmRoot"/>
+      </p:par>
+    </p:tnLst>
+  </p:timing>
+</p:sld>
+</file>
+
+<file path=ppt/slides/slide23.xml><?xml version="1.0" encoding="utf-8"?>
+<p:sld xmlns:a="http://schemas.openxmlformats.org/drawingml/2006/main" xmlns:r="http://schemas.openxmlformats.org/officeDocument/2006/relationships" xmlns:p="http://schemas.openxmlformats.org/presentationml/2006/main">
+  <p:cSld>
+    <p:spTree>
+      <p:nvGrpSpPr>
+        <p:cNvPr id="1" name=""/>
+        <p:cNvGrpSpPr/>
+        <p:nvPr/>
+      </p:nvGrpSpPr>
+      <p:grpSpPr>
+        <a:xfrm>
+          <a:off x="0" y="0"/>
+          <a:ext cx="0" cy="0"/>
+          <a:chOff x="0" y="0"/>
+          <a:chExt cx="0" cy="0"/>
+        </a:xfrm>
+      </p:grpSpPr>
+      <p:sp>
+        <p:nvSpPr>
+          <p:cNvPr id="2" name="Title 1"/>
+          <p:cNvSpPr>
+            <a:spLocks noGrp="1"/>
+          </p:cNvSpPr>
+          <p:nvPr>
+            <p:ph type="title"/>
+          </p:nvPr>
+        </p:nvSpPr>
+        <p:spPr/>
+        <p:txBody>
+          <a:bodyPr/>
+          <a:lstStyle/>
+          <a:p>
+            <a:r>
+              <a:rPr lang="en-CA" dirty="0" smtClean="0"/>
+              <a:t>Top 10 apps by download worldwide</a:t>
+            </a:r>
+            <a:endParaRPr lang="en-CA" dirty="0"/>
+          </a:p>
+        </p:txBody>
+      </p:sp>
+      <p:pic>
+        <p:nvPicPr>
+          <p:cNvPr id="4" name="Picture 3"/>
+          <p:cNvPicPr>
+            <a:picLocks noChangeAspect="1"/>
+          </p:cNvPicPr>
+          <p:nvPr/>
+        </p:nvPicPr>
+        <p:blipFill>
+          <a:blip r:embed="rId2"/>
+          <a:stretch>
+            <a:fillRect/>
+          </a:stretch>
+        </p:blipFill>
+        <p:spPr>
+          <a:xfrm>
+            <a:off x="2625003" y="1384155"/>
+            <a:ext cx="6422015" cy="5450618"/>
+          </a:xfrm>
+          <a:prstGeom prst="rect">
+            <a:avLst/>
+          </a:prstGeom>
+        </p:spPr>
+      </p:pic>
+    </p:spTree>
+    <p:extLst>
+      <p:ext uri="{BB962C8B-B14F-4D97-AF65-F5344CB8AC3E}">
+        <p14:creationId xmlns:p14="http://schemas.microsoft.com/office/powerpoint/2010/main" val="246829619"/>
+      </p:ext>
+    </p:extLst>
+  </p:cSld>
+  <p:clrMapOvr>
+    <a:masterClrMapping/>
+  </p:clrMapOvr>
+  <p:timing>
+    <p:tnLst>
+      <p:par>
+        <p:cTn id="1" dur="indefinite" restart="never" nodeType="tmRoot"/>
+      </p:par>
+    </p:tnLst>
+  </p:timing>
+</p:sld>
+</file>
+
+<file path=ppt/slides/slide24.xml><?xml version="1.0" encoding="utf-8"?>
+<p:sld xmlns:a="http://schemas.openxmlformats.org/drawingml/2006/main" xmlns:r="http://schemas.openxmlformats.org/officeDocument/2006/relationships" xmlns:p="http://schemas.openxmlformats.org/presentationml/2006/main">
+  <p:cSld>
+    <p:spTree>
+      <p:nvGrpSpPr>
+        <p:cNvPr id="1" name=""/>
+        <p:cNvGrpSpPr/>
+        <p:nvPr/>
+      </p:nvGrpSpPr>
+      <p:grpSpPr>
+        <a:xfrm>
+          <a:off x="0" y="0"/>
+          <a:ext cx="0" cy="0"/>
+          <a:chOff x="0" y="0"/>
+          <a:chExt cx="0" cy="0"/>
+        </a:xfrm>
+      </p:grpSpPr>
+      <p:sp>
+        <p:nvSpPr>
+          <p:cNvPr id="2" name="Title 1"/>
+          <p:cNvSpPr>
+            <a:spLocks noGrp="1"/>
+          </p:cNvSpPr>
+          <p:nvPr>
+            <p:ph type="title"/>
+          </p:nvPr>
+        </p:nvSpPr>
+        <p:spPr/>
+        <p:txBody>
+          <a:bodyPr/>
+          <a:lstStyle/>
+          <a:p>
+            <a:r>
+              <a:rPr lang="en-CA" dirty="0" smtClean="0"/>
+              <a:t>Top 10 apps by consumer spend worldwide</a:t>
+            </a:r>
+            <a:endParaRPr lang="en-CA" dirty="0"/>
+          </a:p>
+        </p:txBody>
+      </p:sp>
+      <p:pic>
+        <p:nvPicPr>
+          <p:cNvPr id="4" name="Picture 3"/>
+          <p:cNvPicPr>
+            <a:picLocks noChangeAspect="1"/>
+          </p:cNvPicPr>
+          <p:nvPr/>
+        </p:nvPicPr>
+        <p:blipFill>
+          <a:blip r:embed="rId2"/>
+          <a:stretch>
+            <a:fillRect/>
+          </a:stretch>
+        </p:blipFill>
+        <p:spPr>
+          <a:xfrm>
+            <a:off x="2773073" y="1396278"/>
+            <a:ext cx="5927582" cy="5462674"/>
+          </a:xfrm>
+          <a:prstGeom prst="rect">
+            <a:avLst/>
+          </a:prstGeom>
+        </p:spPr>
+      </p:pic>
+    </p:spTree>
+    <p:extLst>
+      <p:ext uri="{BB962C8B-B14F-4D97-AF65-F5344CB8AC3E}">
+        <p14:creationId xmlns:p14="http://schemas.microsoft.com/office/powerpoint/2010/main" val="2972971916"/>
+      </p:ext>
+    </p:extLst>
+  </p:cSld>
+  <p:clrMapOvr>
+    <a:masterClrMapping/>
+  </p:clrMapOvr>
+  <p:timing>
+    <p:tnLst>
+      <p:par>
+        <p:cTn id="1" dur="indefinite" restart="never" nodeType="tmRoot"/>
+      </p:par>
+    </p:tnLst>
+  </p:timing>
+</p:sld>
+</file>
+
+<file path=ppt/slides/slide25.xml><?xml version="1.0" encoding="utf-8"?>
+<p:sld xmlns:a="http://schemas.openxmlformats.org/drawingml/2006/main" xmlns:r="http://schemas.openxmlformats.org/officeDocument/2006/relationships" xmlns:p="http://schemas.openxmlformats.org/presentationml/2006/main">
+  <p:cSld>
+    <p:spTree>
+      <p:nvGrpSpPr>
+        <p:cNvPr id="1" name=""/>
+        <p:cNvGrpSpPr/>
+        <p:nvPr/>
+      </p:nvGrpSpPr>
+      <p:grpSpPr>
+        <a:xfrm>
+          <a:off x="0" y="0"/>
+          <a:ext cx="0" cy="0"/>
+          <a:chOff x="0" y="0"/>
+          <a:chExt cx="0" cy="0"/>
+        </a:xfrm>
+      </p:grpSpPr>
+      <p:sp>
+        <p:nvSpPr>
+          <p:cNvPr id="2" name="Title 1"/>
+          <p:cNvSpPr>
+            <a:spLocks noGrp="1"/>
+          </p:cNvSpPr>
+          <p:nvPr>
+            <p:ph type="title"/>
+          </p:nvPr>
+        </p:nvSpPr>
+        <p:spPr/>
+        <p:txBody>
+          <a:bodyPr/>
+          <a:lstStyle/>
+          <a:p>
+            <a:r>
+              <a:rPr lang="en-CA" dirty="0" smtClean="0"/>
+              <a:t>Android vs </a:t>
+            </a:r>
+            <a:r>
+              <a:rPr lang="en-CA" dirty="0" err="1" smtClean="0"/>
+              <a:t>ios</a:t>
+            </a:r>
+            <a:endParaRPr lang="en-CA" dirty="0"/>
+          </a:p>
+        </p:txBody>
+      </p:sp>
+      <p:sp>
+        <p:nvSpPr>
+          <p:cNvPr id="3" name="Content Placeholder 2"/>
+          <p:cNvSpPr>
+            <a:spLocks noGrp="1"/>
+          </p:cNvSpPr>
+          <p:nvPr>
+            <p:ph idx="1"/>
+          </p:nvPr>
+        </p:nvSpPr>
+        <p:spPr>
+          <a:xfrm>
+            <a:off x="838200" y="1825625"/>
+            <a:ext cx="3886200" cy="4351338"/>
+          </a:xfrm>
+        </p:spPr>
+        <p:txBody>
+          <a:bodyPr/>
+          <a:lstStyle/>
+          <a:p>
+            <a:r>
+              <a:rPr lang="en-CA" dirty="0" err="1" smtClean="0"/>
+              <a:t>Iphone</a:t>
+            </a:r>
+            <a:r>
+              <a:rPr lang="en-CA" dirty="0" smtClean="0"/>
+              <a:t> 22.8%</a:t>
+            </a:r>
+          </a:p>
+          <a:p>
+            <a:r>
+              <a:rPr lang="en-CA" dirty="0" smtClean="0"/>
+              <a:t>Android 74.4%</a:t>
+            </a:r>
+          </a:p>
+          <a:p>
+            <a:r>
+              <a:rPr lang="en-CA" dirty="0" smtClean="0"/>
+              <a:t>Android sells more phones because of China and India</a:t>
+            </a:r>
+          </a:p>
+          <a:p>
+            <a:r>
+              <a:rPr lang="en-CA" dirty="0" smtClean="0"/>
+              <a:t>Android sells wider range of devices (and price)</a:t>
+            </a:r>
+            <a:endParaRPr lang="en-CA" dirty="0"/>
+          </a:p>
+        </p:txBody>
+      </p:sp>
+      <p:pic>
+        <p:nvPicPr>
+          <p:cNvPr id="2050" name="Picture 2" descr="iphone v android market share main"/>
+          <p:cNvPicPr>
+            <a:picLocks noChangeAspect="1" noChangeArrowheads="1"/>
+          </p:cNvPicPr>
+          <p:nvPr/>
+        </p:nvPicPr>
+        <p:blipFill>
+          <a:blip r:embed="rId2">
+            <a:extLst>
+              <a:ext uri="{28A0092B-C50C-407E-A947-70E740481C1C}">
+                <a14:useLocalDpi xmlns:a14="http://schemas.microsoft.com/office/drawing/2010/main" val="0"/>
+              </a:ext>
+            </a:extLst>
+          </a:blip>
+          <a:srcRect/>
+          <a:stretch>
+            <a:fillRect/>
+          </a:stretch>
+        </p:blipFill>
+        <p:spPr bwMode="auto">
+          <a:xfrm>
+            <a:off x="5778885" y="-113001"/>
+            <a:ext cx="6413115" cy="3607377"/>
+          </a:xfrm>
+          <a:prstGeom prst="rect">
+            <a:avLst/>
+          </a:prstGeom>
+          <a:noFill/>
+          <a:extLst>
+            <a:ext uri="{909E8E84-426E-40DD-AFC4-6F175D3DCCD1}">
+              <a14:hiddenFill xmlns:a14="http://schemas.microsoft.com/office/drawing/2010/main">
+                <a:solidFill>
+                  <a:srgbClr val="FFFFFF"/>
+                </a:solidFill>
+              </a14:hiddenFill>
+            </a:ext>
+          </a:extLst>
+        </p:spPr>
+      </p:pic>
+      <p:pic>
+        <p:nvPicPr>
+          <p:cNvPr id="4" name="Picture 3"/>
+          <p:cNvPicPr>
+            <a:picLocks noChangeAspect="1"/>
+          </p:cNvPicPr>
+          <p:nvPr/>
+        </p:nvPicPr>
+        <p:blipFill>
+          <a:blip r:embed="rId3"/>
+          <a:stretch>
+            <a:fillRect/>
+          </a:stretch>
+        </p:blipFill>
+        <p:spPr>
+          <a:xfrm>
+            <a:off x="6095999" y="3079777"/>
+            <a:ext cx="4558145" cy="3785280"/>
+          </a:xfrm>
+          <a:prstGeom prst="rect">
+            <a:avLst/>
+          </a:prstGeom>
+        </p:spPr>
+      </p:pic>
+    </p:spTree>
+    <p:extLst>
+      <p:ext uri="{BB962C8B-B14F-4D97-AF65-F5344CB8AC3E}">
+        <p14:creationId xmlns:p14="http://schemas.microsoft.com/office/powerpoint/2010/main" val="1035888353"/>
+      </p:ext>
+    </p:extLst>
+  </p:cSld>
+  <p:clrMapOvr>
+    <a:masterClrMapping/>
+  </p:clrMapOvr>
+  <p:timing>
+    <p:tnLst>
+      <p:par>
+        <p:cTn id="1" dur="indefinite" restart="never" nodeType="tmRoot"/>
+      </p:par>
+    </p:tnLst>
+  </p:timing>
+</p:sld>
+</file>
+
+<file path=ppt/slides/slide26.xml><?xml version="1.0" encoding="utf-8"?>
+<p:sld xmlns:a="http://schemas.openxmlformats.org/drawingml/2006/main" xmlns:r="http://schemas.openxmlformats.org/officeDocument/2006/relationships" xmlns:p="http://schemas.openxmlformats.org/presentationml/2006/main">
+  <p:cSld>
+    <p:spTree>
+      <p:nvGrpSpPr>
+        <p:cNvPr id="1" name=""/>
+        <p:cNvGrpSpPr/>
+        <p:nvPr/>
+      </p:nvGrpSpPr>
+      <p:grpSpPr>
+        <a:xfrm>
+          <a:off x="0" y="0"/>
+          <a:ext cx="0" cy="0"/>
+          <a:chOff x="0" y="0"/>
+          <a:chExt cx="0" cy="0"/>
+        </a:xfrm>
+      </p:grpSpPr>
+      <p:sp>
+        <p:nvSpPr>
+          <p:cNvPr id="2" name="Title 1"/>
+          <p:cNvSpPr>
+            <a:spLocks noGrp="1"/>
+          </p:cNvSpPr>
+          <p:nvPr>
+            <p:ph type="title"/>
+          </p:nvPr>
+        </p:nvSpPr>
+        <p:spPr/>
+        <p:txBody>
+          <a:bodyPr/>
+          <a:lstStyle/>
+          <a:p>
+            <a:r>
+              <a:rPr lang="en-CA" dirty="0" smtClean="0"/>
+              <a:t>Google play and Apple App Store</a:t>
+            </a:r>
+            <a:endParaRPr lang="en-CA" dirty="0"/>
+          </a:p>
+        </p:txBody>
+      </p:sp>
+      <p:sp>
+        <p:nvSpPr>
+          <p:cNvPr id="3" name="Content Placeholder 2"/>
+          <p:cNvSpPr>
+            <a:spLocks noGrp="1"/>
+          </p:cNvSpPr>
+          <p:nvPr>
+            <p:ph idx="1"/>
+          </p:nvPr>
+        </p:nvSpPr>
+        <p:spPr>
+          <a:xfrm>
+            <a:off x="838200" y="1825625"/>
+            <a:ext cx="3997036" cy="1535815"/>
+          </a:xfrm>
+        </p:spPr>
+        <p:txBody>
+          <a:bodyPr>
+            <a:normAutofit fontScale="77500" lnSpcReduction="20000"/>
+          </a:bodyPr>
+          <a:lstStyle/>
+          <a:p>
+            <a:r>
+              <a:rPr lang="en-CA" dirty="0" smtClean="0"/>
+              <a:t>Google Play has 2x the number of users as Apple App store</a:t>
+            </a:r>
+          </a:p>
+          <a:p>
+            <a:r>
+              <a:rPr lang="en-CA" dirty="0" smtClean="0"/>
+              <a:t>Apple app store generates 2x the revenue of Google </a:t>
+            </a:r>
+            <a:r>
+              <a:rPr lang="en-CA" dirty="0"/>
+              <a:t>P</a:t>
+            </a:r>
+            <a:r>
+              <a:rPr lang="en-CA" dirty="0" smtClean="0"/>
+              <a:t>lay</a:t>
+            </a:r>
+            <a:endParaRPr lang="en-CA" dirty="0"/>
+          </a:p>
+        </p:txBody>
+      </p:sp>
+      <p:pic>
+        <p:nvPicPr>
+          <p:cNvPr id="4" name="Picture 3"/>
+          <p:cNvPicPr>
+            <a:picLocks noChangeAspect="1"/>
+          </p:cNvPicPr>
+          <p:nvPr/>
+        </p:nvPicPr>
+        <p:blipFill>
+          <a:blip r:embed="rId2"/>
+          <a:stretch>
+            <a:fillRect/>
+          </a:stretch>
+        </p:blipFill>
+        <p:spPr>
+          <a:xfrm>
+            <a:off x="6291262" y="1295833"/>
+            <a:ext cx="5705475" cy="3629025"/>
+          </a:xfrm>
+          <a:prstGeom prst="rect">
+            <a:avLst/>
+          </a:prstGeom>
+        </p:spPr>
+      </p:pic>
+      <p:pic>
+        <p:nvPicPr>
+          <p:cNvPr id="1028" name="Picture 4" descr="https://deviceatlas.com/sites/deviceatlas.com/files/images/map-world-os-q1-2019-med.png"/>
+          <p:cNvPicPr>
+            <a:picLocks noChangeAspect="1" noChangeArrowheads="1"/>
+          </p:cNvPicPr>
+          <p:nvPr/>
+        </p:nvPicPr>
+        <p:blipFill>
+          <a:blip r:embed="rId3">
+            <a:extLst>
+              <a:ext uri="{28A0092B-C50C-407E-A947-70E740481C1C}">
+                <a14:useLocalDpi xmlns:a14="http://schemas.microsoft.com/office/drawing/2010/main" val="0"/>
+              </a:ext>
+            </a:extLst>
+          </a:blip>
+          <a:srcRect/>
+          <a:stretch>
+            <a:fillRect/>
+          </a:stretch>
+        </p:blipFill>
+        <p:spPr bwMode="auto">
+          <a:xfrm>
+            <a:off x="204509" y="3361440"/>
+            <a:ext cx="6212061" cy="3344160"/>
+          </a:xfrm>
+          <a:prstGeom prst="rect">
+            <a:avLst/>
+          </a:prstGeom>
+          <a:noFill/>
+          <a:extLst>
+            <a:ext uri="{909E8E84-426E-40DD-AFC4-6F175D3DCCD1}">
+              <a14:hiddenFill xmlns:a14="http://schemas.microsoft.com/office/drawing/2010/main">
+                <a:solidFill>
+                  <a:srgbClr val="FFFFFF"/>
+                </a:solidFill>
+              </a14:hiddenFill>
+            </a:ext>
+          </a:extLst>
+        </p:spPr>
+      </p:pic>
+    </p:spTree>
+    <p:extLst>
+      <p:ext uri="{BB962C8B-B14F-4D97-AF65-F5344CB8AC3E}">
+        <p14:creationId xmlns:p14="http://schemas.microsoft.com/office/powerpoint/2010/main" val="517430102"/>
+      </p:ext>
+    </p:extLst>
+  </p:cSld>
+  <p:clrMapOvr>
+    <a:masterClrMapping/>
+  </p:clrMapOvr>
+  <p:timing>
+    <p:tnLst>
+      <p:par>
+        <p:cTn id="1" dur="indefinite" restart="never" nodeType="tmRoot"/>
+      </p:par>
+    </p:tnLst>
+  </p:timing>
+</p:sld>
+</file>
+
+<file path=ppt/slides/slide27.xml><?xml version="1.0" encoding="utf-8"?>
+<p:sld xmlns:a="http://schemas.openxmlformats.org/drawingml/2006/main" xmlns:r="http://schemas.openxmlformats.org/officeDocument/2006/relationships" xmlns:p="http://schemas.openxmlformats.org/presentationml/2006/main">
+  <p:cSld>
+    <p:spTree>
+      <p:nvGrpSpPr>
+        <p:cNvPr id="1" name=""/>
+        <p:cNvGrpSpPr/>
+        <p:nvPr/>
+      </p:nvGrpSpPr>
+      <p:grpSpPr>
+        <a:xfrm>
+          <a:off x="0" y="0"/>
+          <a:ext cx="0" cy="0"/>
+          <a:chOff x="0" y="0"/>
+          <a:chExt cx="0" cy="0"/>
+        </a:xfrm>
+      </p:grpSpPr>
+      <p:sp>
+        <p:nvSpPr>
+          <p:cNvPr id="2" name="Title 1"/>
+          <p:cNvSpPr>
+            <a:spLocks noGrp="1"/>
+          </p:cNvSpPr>
+          <p:nvPr>
+            <p:ph type="title"/>
+          </p:nvPr>
+        </p:nvSpPr>
+        <p:spPr/>
+        <p:txBody>
+          <a:bodyPr/>
+          <a:lstStyle/>
+          <a:p>
+            <a:r>
+              <a:rPr lang="en-CA" dirty="0" smtClean="0"/>
+              <a:t>Resources:</a:t>
+            </a:r>
+            <a:endParaRPr lang="en-CA" dirty="0"/>
+          </a:p>
+        </p:txBody>
+      </p:sp>
+      <p:sp>
+        <p:nvSpPr>
+          <p:cNvPr id="3" name="Content Placeholder 2"/>
+          <p:cNvSpPr>
+            <a:spLocks noGrp="1"/>
+          </p:cNvSpPr>
+          <p:nvPr>
+            <p:ph idx="1"/>
+          </p:nvPr>
+        </p:nvSpPr>
+        <p:spPr/>
+        <p:txBody>
+          <a:bodyPr/>
+          <a:lstStyle/>
+          <a:p>
+            <a:r>
+              <a:rPr lang="en-CA" dirty="0"/>
+              <a:t>Android developer conference (this October</a:t>
+            </a:r>
+            <a:r>
+              <a:rPr lang="en-CA" dirty="0" smtClean="0"/>
+              <a:t>)</a:t>
+            </a:r>
+            <a:endParaRPr lang="en-CA" dirty="0" smtClean="0">
+              <a:hlinkClick r:id="rId2"/>
+            </a:endParaRPr>
+          </a:p>
+          <a:p>
+            <a:r>
+              <a:rPr lang="en-CA" dirty="0" smtClean="0">
+                <a:hlinkClick r:id="rId2"/>
+              </a:rPr>
+              <a:t>https</a:t>
+            </a:r>
+            <a:r>
+              <a:rPr lang="en-CA" dirty="0">
+                <a:hlinkClick r:id="rId2"/>
+              </a:rPr>
+              <a:t>://</a:t>
+            </a:r>
+            <a:r>
+              <a:rPr lang="en-CA" dirty="0" smtClean="0">
+                <a:hlinkClick r:id="rId2"/>
+              </a:rPr>
+              <a:t>developer.android.com/dev-summit</a:t>
+            </a:r>
+            <a:endParaRPr lang="en-CA" dirty="0" smtClean="0"/>
+          </a:p>
+          <a:p>
+            <a:r>
+              <a:rPr lang="en-CA" dirty="0" smtClean="0"/>
+              <a:t>Android developer guide:</a:t>
+            </a:r>
+            <a:endParaRPr lang="en-CA" dirty="0"/>
+          </a:p>
+          <a:p>
+            <a:r>
+              <a:rPr lang="en-CA" dirty="0">
+                <a:hlinkClick r:id="rId3"/>
+              </a:rPr>
+              <a:t>https://</a:t>
+            </a:r>
+            <a:r>
+              <a:rPr lang="en-CA" dirty="0" smtClean="0">
+                <a:hlinkClick r:id="rId3"/>
+              </a:rPr>
+              <a:t>developer.android.com/guide</a:t>
+            </a:r>
+            <a:endParaRPr lang="en-CA" dirty="0" smtClean="0"/>
+          </a:p>
+          <a:p>
+            <a:r>
+              <a:rPr lang="en-CA" dirty="0" smtClean="0"/>
+              <a:t>Android developer documentation</a:t>
+            </a:r>
+          </a:p>
+          <a:p>
+            <a:r>
+              <a:rPr lang="en-CA" dirty="0">
+                <a:hlinkClick r:id="rId4"/>
+              </a:rPr>
+              <a:t>https://developer.android.com/docs</a:t>
+            </a:r>
+            <a:endParaRPr lang="en-CA" dirty="0"/>
+          </a:p>
+        </p:txBody>
+      </p:sp>
+    </p:spTree>
+    <p:extLst>
+      <p:ext uri="{BB962C8B-B14F-4D97-AF65-F5344CB8AC3E}">
+        <p14:creationId xmlns:p14="http://schemas.microsoft.com/office/powerpoint/2010/main" val="3371915275"/>
+      </p:ext>
+    </p:extLst>
+  </p:cSld>
+  <p:clrMapOvr>
+    <a:masterClrMapping/>
+  </p:clrMapOvr>
+  <p:timing>
+    <p:tnLst>
+      <p:par>
+        <p:cTn id="1" dur="indefinite" restart="never" nodeType="tmRoot"/>
+      </p:par>
+    </p:tnLst>
+  </p:timing>
+</p:sld>
+</file>
+
+<file path=ppt/slides/slide28.xml><?xml version="1.0" encoding="utf-8"?>
+<p:sld xmlns:a="http://schemas.openxmlformats.org/drawingml/2006/main" xmlns:r="http://schemas.openxmlformats.org/officeDocument/2006/relationships" xmlns:p="http://schemas.openxmlformats.org/presentationml/2006/main">
+  <p:cSld>
+    <p:spTree>
+      <p:nvGrpSpPr>
+        <p:cNvPr id="1" name=""/>
+        <p:cNvGrpSpPr/>
+        <p:nvPr/>
+      </p:nvGrpSpPr>
+      <p:grpSpPr>
+        <a:xfrm>
+          <a:off x="0" y="0"/>
+          <a:ext cx="0" cy="0"/>
+          <a:chOff x="0" y="0"/>
+          <a:chExt cx="0" cy="0"/>
+        </a:xfrm>
+      </p:grpSpPr>
+      <p:sp>
+        <p:nvSpPr>
+          <p:cNvPr id="2" name="Title 1"/>
+          <p:cNvSpPr>
+            <a:spLocks noGrp="1"/>
+          </p:cNvSpPr>
+          <p:nvPr>
+            <p:ph type="title"/>
+          </p:nvPr>
+        </p:nvSpPr>
+        <p:spPr/>
+        <p:txBody>
+          <a:bodyPr/>
+          <a:lstStyle/>
+          <a:p>
+            <a:r>
+              <a:rPr lang="en-CA" dirty="0" smtClean="0"/>
+              <a:t>Prerequisites and goals</a:t>
+            </a:r>
+            <a:endParaRPr lang="en-CA" dirty="0"/>
+          </a:p>
+        </p:txBody>
+      </p:sp>
+      <p:sp>
+        <p:nvSpPr>
+          <p:cNvPr id="3" name="Content Placeholder 2"/>
+          <p:cNvSpPr>
+            <a:spLocks noGrp="1"/>
+          </p:cNvSpPr>
+          <p:nvPr>
+            <p:ph idx="1"/>
+          </p:nvPr>
+        </p:nvSpPr>
+        <p:spPr>
+          <a:xfrm>
+            <a:off x="838199" y="1950316"/>
+            <a:ext cx="11090565" cy="4351338"/>
+          </a:xfrm>
+        </p:spPr>
+        <p:txBody>
+          <a:bodyPr/>
+          <a:lstStyle/>
+          <a:p>
+            <a:r>
+              <a:rPr lang="en-CA" dirty="0" smtClean="0"/>
+              <a:t>Familiarity with at least one object-oriented programming language (preferably java or C++)</a:t>
+            </a:r>
+          </a:p>
+          <a:p>
+            <a:r>
+              <a:rPr lang="en-CA" dirty="0" smtClean="0"/>
+              <a:t>Should recognize the following terms: </a:t>
+            </a:r>
+            <a:r>
+              <a:rPr lang="en-CA" i="1" dirty="0" smtClean="0"/>
+              <a:t>class, constructor, interface, getter, setter, generic types</a:t>
+            </a:r>
+          </a:p>
+          <a:p>
+            <a:endParaRPr lang="en-CA" dirty="0"/>
+          </a:p>
+        </p:txBody>
+      </p:sp>
+    </p:spTree>
+    <p:extLst>
+      <p:ext uri="{BB962C8B-B14F-4D97-AF65-F5344CB8AC3E}">
+        <p14:creationId xmlns:p14="http://schemas.microsoft.com/office/powerpoint/2010/main" val="2313153903"/>
+      </p:ext>
+    </p:extLst>
+  </p:cSld>
+  <p:clrMapOvr>
+    <a:masterClrMapping/>
+  </p:clrMapOvr>
+  <p:timing>
+    <p:tnLst>
+      <p:par>
+        <p:cTn id="1" dur="indefinite" restart="never" nodeType="tmRoot"/>
+      </p:par>
+    </p:tnLst>
+  </p:timing>
+</p:sld>
+</file>
+
+<file path=ppt/slides/slide29.xml><?xml version="1.0" encoding="utf-8"?>
+<p:sld xmlns:a="http://schemas.openxmlformats.org/drawingml/2006/main" xmlns:r="http://schemas.openxmlformats.org/officeDocument/2006/relationships" xmlns:p="http://schemas.openxmlformats.org/presentationml/2006/main">
+  <p:cSld>
+    <p:spTree>
+      <p:nvGrpSpPr>
+        <p:cNvPr id="1" name=""/>
+        <p:cNvGrpSpPr/>
+        <p:nvPr/>
+      </p:nvGrpSpPr>
+      <p:grpSpPr>
+        <a:xfrm>
+          <a:off x="0" y="0"/>
+          <a:ext cx="0" cy="0"/>
+          <a:chOff x="0" y="0"/>
+          <a:chExt cx="0" cy="0"/>
+        </a:xfrm>
+      </p:grpSpPr>
+      <p:sp>
+        <p:nvSpPr>
+          <p:cNvPr id="2" name="Title 1"/>
+          <p:cNvSpPr>
+            <a:spLocks noGrp="1"/>
+          </p:cNvSpPr>
+          <p:nvPr>
+            <p:ph type="title"/>
+          </p:nvPr>
+        </p:nvSpPr>
+        <p:spPr/>
+        <p:txBody>
+          <a:bodyPr/>
+          <a:lstStyle/>
+          <a:p>
+            <a:r>
+              <a:rPr lang="en-CA" dirty="0" smtClean="0"/>
               <a:t>Mobile apps</a:t>
             </a:r>
             <a:endParaRPr lang="en-CA" dirty="0"/>
@@ -3331,7 +6142,7 @@
         </p:blipFill>
         <p:spPr>
           <a:xfrm>
-            <a:off x="838200" y="2849274"/>
+            <a:off x="852921" y="2423614"/>
             <a:ext cx="4772025" cy="2476500"/>
           </a:xfrm>
           <a:prstGeom prst="rect">
@@ -3379,7 +6190,7 @@
         </p:blipFill>
         <p:spPr>
           <a:xfrm>
-            <a:off x="4581525" y="3627725"/>
+            <a:off x="4041089" y="2526721"/>
             <a:ext cx="3028950" cy="2428875"/>
           </a:xfrm>
           <a:prstGeom prst="rect">
@@ -3403,7 +6214,7 @@
         </p:blipFill>
         <p:spPr>
           <a:xfrm>
-            <a:off x="7781925" y="3627725"/>
+            <a:off x="6785912" y="3742969"/>
             <a:ext cx="3571875" cy="2514600"/>
           </a:xfrm>
           <a:prstGeom prst="rect">
@@ -3427,7 +6238,7 @@
         </p:blipFill>
         <p:spPr>
           <a:xfrm>
-            <a:off x="7781925" y="365125"/>
+            <a:off x="7971557" y="195049"/>
             <a:ext cx="4181475" cy="2495550"/>
           </a:xfrm>
           <a:prstGeom prst="rect">
@@ -3451,7 +6262,7 @@
         </p:blipFill>
         <p:spPr>
           <a:xfrm>
-            <a:off x="5504584" y="2118448"/>
+            <a:off x="3830350" y="4659097"/>
             <a:ext cx="3743325" cy="2133600"/>
           </a:xfrm>
           <a:prstGeom prst="rect">
@@ -3475,7 +6286,7 @@
         </p:blipFill>
         <p:spPr>
           <a:xfrm>
-            <a:off x="9333634" y="2868324"/>
+            <a:off x="10062295" y="2716761"/>
             <a:ext cx="2581275" cy="2457450"/>
           </a:xfrm>
           <a:prstGeom prst="rect">
@@ -3499,7 +6310,7 @@
         </p:blipFill>
         <p:spPr>
           <a:xfrm>
-            <a:off x="2683452" y="2787361"/>
+            <a:off x="-1004887" y="3864985"/>
             <a:ext cx="2476500" cy="2619375"/>
           </a:xfrm>
           <a:prstGeom prst="rect">
@@ -3564,7 +6375,7 @@
         </p:blipFill>
         <p:spPr>
           <a:xfrm>
-            <a:off x="9388186" y="4135148"/>
+            <a:off x="9150494" y="1097973"/>
             <a:ext cx="2752725" cy="2543175"/>
           </a:xfrm>
           <a:prstGeom prst="rect">
@@ -3588,7 +6399,7 @@
         </p:blipFill>
         <p:spPr>
           <a:xfrm>
-            <a:off x="4981142" y="804429"/>
+            <a:off x="347230" y="315624"/>
             <a:ext cx="4381500" cy="2533650"/>
           </a:xfrm>
           <a:prstGeom prst="rect">
@@ -3612,7 +6423,7 @@
         </p:blipFill>
         <p:spPr>
           <a:xfrm>
-            <a:off x="5477741" y="4628717"/>
+            <a:off x="2264353" y="961962"/>
             <a:ext cx="3514725" cy="2552700"/>
           </a:xfrm>
           <a:prstGeom prst="rect">
@@ -3630,6 +6441,850 @@
   <p:clrMapOvr>
     <a:masterClrMapping/>
   </p:clrMapOvr>
+  <p:timing>
+    <p:tnLst>
+      <p:par>
+        <p:cTn id="1" dur="indefinite" restart="never" nodeType="tmRoot"/>
+      </p:par>
+    </p:tnLst>
+  </p:timing>
+</p:sld>
+</file>
+
+<file path=ppt/slides/slide3.xml><?xml version="1.0" encoding="utf-8"?>
+<p:sld xmlns:a="http://schemas.openxmlformats.org/drawingml/2006/main" xmlns:r="http://schemas.openxmlformats.org/officeDocument/2006/relationships" xmlns:p="http://schemas.openxmlformats.org/presentationml/2006/main">
+  <p:cSld>
+    <p:spTree>
+      <p:nvGrpSpPr>
+        <p:cNvPr id="1" name=""/>
+        <p:cNvGrpSpPr/>
+        <p:nvPr/>
+      </p:nvGrpSpPr>
+      <p:grpSpPr>
+        <a:xfrm>
+          <a:off x="0" y="0"/>
+          <a:ext cx="0" cy="0"/>
+          <a:chOff x="0" y="0"/>
+          <a:chExt cx="0" cy="0"/>
+        </a:xfrm>
+      </p:grpSpPr>
+      <p:sp>
+        <p:nvSpPr>
+          <p:cNvPr id="2" name="Title 1"/>
+          <p:cNvSpPr>
+            <a:spLocks noGrp="1"/>
+          </p:cNvSpPr>
+          <p:nvPr>
+            <p:ph type="title"/>
+          </p:nvPr>
+        </p:nvSpPr>
+        <p:spPr/>
+        <p:txBody>
+          <a:bodyPr/>
+          <a:lstStyle/>
+          <a:p>
+            <a:r>
+              <a:rPr lang="en-CA" dirty="0" smtClean="0"/>
+              <a:t>Mobile landscape </a:t>
+            </a:r>
+            <a:r>
+              <a:rPr lang="en-CA" dirty="0" smtClean="0"/>
+              <a:t>(2019</a:t>
+            </a:r>
+            <a:r>
+              <a:rPr lang="en-CA" dirty="0" smtClean="0"/>
+              <a:t>)</a:t>
+            </a:r>
+            <a:endParaRPr lang="en-CA" dirty="0"/>
+          </a:p>
+        </p:txBody>
+      </p:sp>
+      <p:sp>
+        <p:nvSpPr>
+          <p:cNvPr id="3" name="Content Placeholder 2"/>
+          <p:cNvSpPr>
+            <a:spLocks noGrp="1"/>
+          </p:cNvSpPr>
+          <p:nvPr>
+            <p:ph idx="1"/>
+          </p:nvPr>
+        </p:nvSpPr>
+        <p:spPr/>
+        <p:txBody>
+          <a:bodyPr/>
+          <a:lstStyle/>
+          <a:p>
+            <a:r>
+              <a:rPr lang="en-CA" dirty="0" smtClean="0"/>
+              <a:t>Macro trends</a:t>
+            </a:r>
+          </a:p>
+          <a:p>
+            <a:r>
+              <a:rPr lang="en-CA" dirty="0" smtClean="0"/>
+              <a:t>Gaming</a:t>
+            </a:r>
+          </a:p>
+          <a:p>
+            <a:r>
+              <a:rPr lang="en-CA" dirty="0" smtClean="0"/>
+              <a:t>Retail</a:t>
+            </a:r>
+          </a:p>
+          <a:p>
+            <a:r>
+              <a:rPr lang="en-CA" dirty="0" smtClean="0"/>
+              <a:t>Restaurant and food delivery</a:t>
+            </a:r>
+          </a:p>
+          <a:p>
+            <a:r>
+              <a:rPr lang="en-CA" dirty="0" smtClean="0"/>
+              <a:t>Banking and finance</a:t>
+            </a:r>
+          </a:p>
+          <a:p>
+            <a:r>
+              <a:rPr lang="en-CA" dirty="0" smtClean="0"/>
+              <a:t>Video streaming</a:t>
+            </a:r>
+          </a:p>
+          <a:p>
+            <a:r>
+              <a:rPr lang="en-CA" dirty="0" smtClean="0"/>
+              <a:t>Social networking and messaging</a:t>
+            </a:r>
+          </a:p>
+          <a:p>
+            <a:r>
+              <a:rPr lang="en-CA" dirty="0" smtClean="0"/>
+              <a:t>travel</a:t>
+            </a:r>
+          </a:p>
+          <a:p>
+            <a:pPr marL="457200" lvl="1" indent="0">
+              <a:buNone/>
+            </a:pPr>
+            <a:endParaRPr lang="en-CA" dirty="0"/>
+          </a:p>
+        </p:txBody>
+      </p:sp>
+    </p:spTree>
+    <p:extLst>
+      <p:ext uri="{BB962C8B-B14F-4D97-AF65-F5344CB8AC3E}">
+        <p14:creationId xmlns:p14="http://schemas.microsoft.com/office/powerpoint/2010/main" val="1345938479"/>
+      </p:ext>
+    </p:extLst>
+  </p:cSld>
+  <p:clrMapOvr>
+    <a:masterClrMapping/>
+  </p:clrMapOvr>
+  <p:timing>
+    <p:tnLst>
+      <p:par>
+        <p:cTn id="1" dur="indefinite" restart="never" nodeType="tmRoot"/>
+      </p:par>
+    </p:tnLst>
+  </p:timing>
+</p:sld>
+</file>
+
+<file path=ppt/slides/slide30.xml><?xml version="1.0" encoding="utf-8"?>
+<p:sld xmlns:a="http://schemas.openxmlformats.org/drawingml/2006/main" xmlns:r="http://schemas.openxmlformats.org/officeDocument/2006/relationships" xmlns:p="http://schemas.openxmlformats.org/presentationml/2006/main">
+  <p:cSld>
+    <p:spTree>
+      <p:nvGrpSpPr>
+        <p:cNvPr id="1" name=""/>
+        <p:cNvGrpSpPr/>
+        <p:nvPr/>
+      </p:nvGrpSpPr>
+      <p:grpSpPr>
+        <a:xfrm>
+          <a:off x="0" y="0"/>
+          <a:ext cx="0" cy="0"/>
+          <a:chOff x="0" y="0"/>
+          <a:chExt cx="0" cy="0"/>
+        </a:xfrm>
+      </p:grpSpPr>
+      <p:sp>
+        <p:nvSpPr>
+          <p:cNvPr id="2" name="Title 1"/>
+          <p:cNvSpPr>
+            <a:spLocks noGrp="1"/>
+          </p:cNvSpPr>
+          <p:nvPr>
+            <p:ph type="title"/>
+          </p:nvPr>
+        </p:nvSpPr>
+        <p:spPr/>
+        <p:txBody>
+          <a:bodyPr/>
+          <a:lstStyle/>
+          <a:p>
+            <a:r>
+              <a:rPr lang="en-CA" dirty="0" smtClean="0"/>
+              <a:t>Learning app through examples:</a:t>
+            </a:r>
+            <a:endParaRPr lang="en-CA" dirty="0"/>
+          </a:p>
+        </p:txBody>
+      </p:sp>
+      <p:sp>
+        <p:nvSpPr>
+          <p:cNvPr id="3" name="Content Placeholder 2"/>
+          <p:cNvSpPr>
+            <a:spLocks noGrp="1"/>
+          </p:cNvSpPr>
+          <p:nvPr>
+            <p:ph idx="1"/>
+          </p:nvPr>
+        </p:nvSpPr>
+        <p:spPr/>
+        <p:txBody>
+          <a:bodyPr>
+            <a:normAutofit fontScale="92500" lnSpcReduction="10000"/>
+          </a:bodyPr>
+          <a:lstStyle/>
+          <a:p>
+            <a:r>
+              <a:rPr lang="en-CA" dirty="0" smtClean="0"/>
+              <a:t>The location tracker app</a:t>
+            </a:r>
+          </a:p>
+          <a:p>
+            <a:r>
+              <a:rPr lang="en-CA" dirty="0" smtClean="0"/>
+              <a:t>The system scanning app</a:t>
+            </a:r>
+          </a:p>
+          <a:p>
+            <a:r>
+              <a:rPr lang="en-CA" dirty="0" smtClean="0"/>
+              <a:t>The multimedia streaming app</a:t>
+            </a:r>
+          </a:p>
+          <a:p>
+            <a:r>
+              <a:rPr lang="en-CA" dirty="0" smtClean="0"/>
+              <a:t>The messenger/communication app</a:t>
+            </a:r>
+          </a:p>
+          <a:p>
+            <a:r>
+              <a:rPr lang="en-CA" dirty="0" smtClean="0"/>
+              <a:t>The game app</a:t>
+            </a:r>
+          </a:p>
+          <a:p>
+            <a:pPr lvl="1"/>
+            <a:r>
+              <a:rPr lang="en-CA" dirty="0" smtClean="0"/>
+              <a:t>Unity, graphics2D, </a:t>
+            </a:r>
+            <a:r>
+              <a:rPr lang="en-CA" dirty="0" err="1" smtClean="0"/>
+              <a:t>openGL</a:t>
+            </a:r>
+            <a:endParaRPr lang="en-CA" dirty="0" smtClean="0"/>
+          </a:p>
+          <a:p>
+            <a:r>
+              <a:rPr lang="en-CA" dirty="0" smtClean="0"/>
+              <a:t>The social media/sharing app</a:t>
+            </a:r>
+          </a:p>
+          <a:p>
+            <a:r>
+              <a:rPr lang="en-CA" dirty="0" smtClean="0"/>
+              <a:t>The selfie editing app</a:t>
+            </a:r>
+          </a:p>
+          <a:p>
+            <a:endParaRPr lang="en-CA" dirty="0"/>
+          </a:p>
+          <a:p>
+            <a:r>
+              <a:rPr lang="en-CA" dirty="0" smtClean="0"/>
+              <a:t>What do all these apps have in common? UI, </a:t>
+            </a:r>
+          </a:p>
+        </p:txBody>
+      </p:sp>
+    </p:spTree>
+    <p:extLst>
+      <p:ext uri="{BB962C8B-B14F-4D97-AF65-F5344CB8AC3E}">
+        <p14:creationId xmlns:p14="http://schemas.microsoft.com/office/powerpoint/2010/main" val="4230979639"/>
+      </p:ext>
+    </p:extLst>
+  </p:cSld>
+  <p:clrMapOvr>
+    <a:masterClrMapping/>
+  </p:clrMapOvr>
+  <p:timing>
+    <p:tnLst>
+      <p:par>
+        <p:cTn id="1" dur="indefinite" restart="never" nodeType="tmRoot"/>
+      </p:par>
+    </p:tnLst>
+  </p:timing>
+</p:sld>
+</file>
+
+<file path=ppt/slides/slide31.xml><?xml version="1.0" encoding="utf-8"?>
+<p:sld xmlns:a="http://schemas.openxmlformats.org/drawingml/2006/main" xmlns:r="http://schemas.openxmlformats.org/officeDocument/2006/relationships" xmlns:p="http://schemas.openxmlformats.org/presentationml/2006/main">
+  <p:cSld>
+    <p:spTree>
+      <p:nvGrpSpPr>
+        <p:cNvPr id="1" name=""/>
+        <p:cNvGrpSpPr/>
+        <p:nvPr/>
+      </p:nvGrpSpPr>
+      <p:grpSpPr>
+        <a:xfrm>
+          <a:off x="0" y="0"/>
+          <a:ext cx="0" cy="0"/>
+          <a:chOff x="0" y="0"/>
+          <a:chExt cx="0" cy="0"/>
+        </a:xfrm>
+      </p:grpSpPr>
+      <p:sp>
+        <p:nvSpPr>
+          <p:cNvPr id="2" name="Title 1"/>
+          <p:cNvSpPr>
+            <a:spLocks noGrp="1"/>
+          </p:cNvSpPr>
+          <p:nvPr>
+            <p:ph type="title"/>
+          </p:nvPr>
+        </p:nvSpPr>
+        <p:spPr/>
+        <p:txBody>
+          <a:bodyPr/>
+          <a:lstStyle/>
+          <a:p>
+            <a:r>
+              <a:rPr lang="en-CA" dirty="0" smtClean="0"/>
+              <a:t>Reverse engineer popular apps</a:t>
+            </a:r>
+            <a:endParaRPr lang="en-CA" dirty="0"/>
+          </a:p>
+        </p:txBody>
+      </p:sp>
+      <p:sp>
+        <p:nvSpPr>
+          <p:cNvPr id="3" name="Content Placeholder 2"/>
+          <p:cNvSpPr>
+            <a:spLocks noGrp="1"/>
+          </p:cNvSpPr>
+          <p:nvPr>
+            <p:ph idx="1"/>
+          </p:nvPr>
+        </p:nvSpPr>
+        <p:spPr/>
+        <p:txBody>
+          <a:bodyPr/>
+          <a:lstStyle/>
+          <a:p>
+            <a:r>
+              <a:rPr lang="en-CA" dirty="0" smtClean="0"/>
+              <a:t>Reverse engineer popular apps, and replicate their basic functionality</a:t>
+            </a:r>
+          </a:p>
+          <a:p>
+            <a:endParaRPr lang="en-CA" dirty="0"/>
+          </a:p>
+        </p:txBody>
+      </p:sp>
+    </p:spTree>
+    <p:extLst>
+      <p:ext uri="{BB962C8B-B14F-4D97-AF65-F5344CB8AC3E}">
+        <p14:creationId xmlns:p14="http://schemas.microsoft.com/office/powerpoint/2010/main" val="4139711775"/>
+      </p:ext>
+    </p:extLst>
+  </p:cSld>
+  <p:clrMapOvr>
+    <a:masterClrMapping/>
+  </p:clrMapOvr>
+  <p:timing>
+    <p:tnLst>
+      <p:par>
+        <p:cTn id="1" dur="indefinite" restart="never" nodeType="tmRoot"/>
+      </p:par>
+    </p:tnLst>
+  </p:timing>
+</p:sld>
+</file>
+
+<file path=ppt/slides/slide32.xml><?xml version="1.0" encoding="utf-8"?>
+<p:sld xmlns:a="http://schemas.openxmlformats.org/drawingml/2006/main" xmlns:r="http://schemas.openxmlformats.org/officeDocument/2006/relationships" xmlns:p="http://schemas.openxmlformats.org/presentationml/2006/main">
+  <p:cSld>
+    <p:spTree>
+      <p:nvGrpSpPr>
+        <p:cNvPr id="1" name=""/>
+        <p:cNvGrpSpPr/>
+        <p:nvPr/>
+      </p:nvGrpSpPr>
+      <p:grpSpPr>
+        <a:xfrm>
+          <a:off x="0" y="0"/>
+          <a:ext cx="0" cy="0"/>
+          <a:chOff x="0" y="0"/>
+          <a:chExt cx="0" cy="0"/>
+        </a:xfrm>
+      </p:grpSpPr>
+      <p:sp>
+        <p:nvSpPr>
+          <p:cNvPr id="2" name="Title 1"/>
+          <p:cNvSpPr>
+            <a:spLocks noGrp="1"/>
+          </p:cNvSpPr>
+          <p:nvPr>
+            <p:ph type="title"/>
+          </p:nvPr>
+        </p:nvSpPr>
+        <p:spPr/>
+        <p:txBody>
+          <a:bodyPr/>
+          <a:lstStyle/>
+          <a:p>
+            <a:endParaRPr lang="en-CA"/>
+          </a:p>
+        </p:txBody>
+      </p:sp>
+      <p:sp>
+        <p:nvSpPr>
+          <p:cNvPr id="3" name="Content Placeholder 2"/>
+          <p:cNvSpPr>
+            <a:spLocks noGrp="1"/>
+          </p:cNvSpPr>
+          <p:nvPr>
+            <p:ph idx="1"/>
+          </p:nvPr>
+        </p:nvSpPr>
+        <p:spPr/>
+        <p:txBody>
+          <a:bodyPr>
+            <a:normAutofit lnSpcReduction="10000"/>
+          </a:bodyPr>
+          <a:lstStyle/>
+          <a:p>
+            <a:pPr fontAlgn="base"/>
+            <a:r>
+              <a:rPr lang="en-CA" dirty="0"/>
+              <a:t>An imaginary real estate agent / realtor app. Give them a test web service with a few endpoints:</a:t>
+            </a:r>
+          </a:p>
+          <a:p>
+            <a:pPr fontAlgn="base"/>
+            <a:r>
+              <a:rPr lang="en-CA" dirty="0"/>
+              <a:t>List of properties</a:t>
+            </a:r>
+          </a:p>
+          <a:p>
+            <a:pPr fontAlgn="base"/>
+            <a:r>
+              <a:rPr lang="en-CA" dirty="0"/>
+              <a:t>Property details</a:t>
+            </a:r>
+          </a:p>
+          <a:p>
+            <a:pPr fontAlgn="base"/>
+            <a:r>
+              <a:rPr lang="en-CA" dirty="0"/>
+              <a:t>Maybe tokenized user login (bonus points)</a:t>
+            </a:r>
+          </a:p>
+          <a:p>
+            <a:pPr fontAlgn="base"/>
+            <a:r>
+              <a:rPr lang="en-CA" dirty="0"/>
+              <a:t>Maybe add favourites (bonus points)</a:t>
+            </a:r>
+          </a:p>
+          <a:p>
+            <a:pPr fontAlgn="base"/>
+            <a:r>
+              <a:rPr lang="en-CA" dirty="0"/>
+              <a:t>Making this work would cover a good amount of basic Android development: fragments, layouts, lists, </a:t>
+            </a:r>
+            <a:r>
+              <a:rPr lang="en-CA" dirty="0" err="1"/>
+              <a:t>async</a:t>
+            </a:r>
+            <a:r>
+              <a:rPr lang="en-CA" dirty="0"/>
+              <a:t> image loading, infinite scroll, adapters, web service interaction, navigation, Google Maps display etc.</a:t>
+            </a:r>
+          </a:p>
+          <a:p>
+            <a:endParaRPr lang="en-CA" dirty="0"/>
+          </a:p>
+        </p:txBody>
+      </p:sp>
+    </p:spTree>
+    <p:extLst>
+      <p:ext uri="{BB962C8B-B14F-4D97-AF65-F5344CB8AC3E}">
+        <p14:creationId xmlns:p14="http://schemas.microsoft.com/office/powerpoint/2010/main" val="521289777"/>
+      </p:ext>
+    </p:extLst>
+  </p:cSld>
+  <p:clrMapOvr>
+    <a:masterClrMapping/>
+  </p:clrMapOvr>
+  <p:timing>
+    <p:tnLst>
+      <p:par>
+        <p:cTn id="1" dur="indefinite" restart="never" nodeType="tmRoot"/>
+      </p:par>
+    </p:tnLst>
+  </p:timing>
+</p:sld>
+</file>
+
+<file path=ppt/slides/slide33.xml><?xml version="1.0" encoding="utf-8"?>
+<p:sld xmlns:a="http://schemas.openxmlformats.org/drawingml/2006/main" xmlns:r="http://schemas.openxmlformats.org/officeDocument/2006/relationships" xmlns:p="http://schemas.openxmlformats.org/presentationml/2006/main">
+  <p:cSld>
+    <p:spTree>
+      <p:nvGrpSpPr>
+        <p:cNvPr id="1" name=""/>
+        <p:cNvGrpSpPr/>
+        <p:nvPr/>
+      </p:nvGrpSpPr>
+      <p:grpSpPr>
+        <a:xfrm>
+          <a:off x="0" y="0"/>
+          <a:ext cx="0" cy="0"/>
+          <a:chOff x="0" y="0"/>
+          <a:chExt cx="0" cy="0"/>
+        </a:xfrm>
+      </p:grpSpPr>
+      <p:sp>
+        <p:nvSpPr>
+          <p:cNvPr id="2" name="Title 1"/>
+          <p:cNvSpPr>
+            <a:spLocks noGrp="1"/>
+          </p:cNvSpPr>
+          <p:nvPr>
+            <p:ph type="title"/>
+          </p:nvPr>
+        </p:nvSpPr>
+        <p:spPr/>
+        <p:txBody>
+          <a:bodyPr/>
+          <a:lstStyle/>
+          <a:p>
+            <a:endParaRPr lang="en-CA"/>
+          </a:p>
+        </p:txBody>
+      </p:sp>
+      <p:sp>
+        <p:nvSpPr>
+          <p:cNvPr id="3" name="Content Placeholder 2"/>
+          <p:cNvSpPr>
+            <a:spLocks noGrp="1"/>
+          </p:cNvSpPr>
+          <p:nvPr>
+            <p:ph idx="1"/>
+          </p:nvPr>
+        </p:nvSpPr>
+        <p:spPr/>
+        <p:txBody>
+          <a:bodyPr/>
+          <a:lstStyle/>
+          <a:p>
+            <a:r>
+              <a:rPr lang="en-CA" dirty="0"/>
+              <a:t>The majority of android development is making an </a:t>
+            </a:r>
+            <a:r>
+              <a:rPr lang="en-CA" dirty="0" err="1"/>
+              <a:t>api</a:t>
+            </a:r>
+            <a:r>
+              <a:rPr lang="en-CA" dirty="0"/>
+              <a:t> call and displaying a list of data from that. You'll probably want to cover that. And something to include custom views/</a:t>
+            </a:r>
+            <a:r>
+              <a:rPr lang="en-CA" dirty="0" err="1"/>
+              <a:t>viewgroups</a:t>
+            </a:r>
+            <a:r>
+              <a:rPr lang="en-CA" dirty="0"/>
+              <a:t> and what role those play</a:t>
+            </a:r>
+          </a:p>
+        </p:txBody>
+      </p:sp>
+    </p:spTree>
+    <p:extLst>
+      <p:ext uri="{BB962C8B-B14F-4D97-AF65-F5344CB8AC3E}">
+        <p14:creationId xmlns:p14="http://schemas.microsoft.com/office/powerpoint/2010/main" val="2251604124"/>
+      </p:ext>
+    </p:extLst>
+  </p:cSld>
+  <p:clrMapOvr>
+    <a:masterClrMapping/>
+  </p:clrMapOvr>
+  <p:timing>
+    <p:tnLst>
+      <p:par>
+        <p:cTn id="1" dur="indefinite" restart="never" nodeType="tmRoot"/>
+      </p:par>
+    </p:tnLst>
+  </p:timing>
+</p:sld>
+</file>
+
+<file path=ppt/slides/slide34.xml><?xml version="1.0" encoding="utf-8"?>
+<p:sld xmlns:a="http://schemas.openxmlformats.org/drawingml/2006/main" xmlns:r="http://schemas.openxmlformats.org/officeDocument/2006/relationships" xmlns:p="http://schemas.openxmlformats.org/presentationml/2006/main">
+  <p:cSld>
+    <p:spTree>
+      <p:nvGrpSpPr>
+        <p:cNvPr id="1" name=""/>
+        <p:cNvGrpSpPr/>
+        <p:nvPr/>
+      </p:nvGrpSpPr>
+      <p:grpSpPr>
+        <a:xfrm>
+          <a:off x="0" y="0"/>
+          <a:ext cx="0" cy="0"/>
+          <a:chOff x="0" y="0"/>
+          <a:chExt cx="0" cy="0"/>
+        </a:xfrm>
+      </p:grpSpPr>
+      <p:sp>
+        <p:nvSpPr>
+          <p:cNvPr id="2" name="Title 1"/>
+          <p:cNvSpPr>
+            <a:spLocks noGrp="1"/>
+          </p:cNvSpPr>
+          <p:nvPr>
+            <p:ph type="title"/>
+          </p:nvPr>
+        </p:nvSpPr>
+        <p:spPr/>
+        <p:txBody>
+          <a:bodyPr/>
+          <a:lstStyle/>
+          <a:p>
+            <a:endParaRPr lang="en-CA"/>
+          </a:p>
+        </p:txBody>
+      </p:sp>
+      <p:sp>
+        <p:nvSpPr>
+          <p:cNvPr id="3" name="Content Placeholder 2"/>
+          <p:cNvSpPr>
+            <a:spLocks noGrp="1"/>
+          </p:cNvSpPr>
+          <p:nvPr>
+            <p:ph idx="1"/>
+          </p:nvPr>
+        </p:nvSpPr>
+        <p:spPr/>
+        <p:txBody>
+          <a:bodyPr/>
+          <a:lstStyle/>
+          <a:p>
+            <a:pPr fontAlgn="base"/>
+            <a:r>
+              <a:rPr lang="en-CA" dirty="0"/>
+              <a:t>A note taking app. This is what I build for new frameworks that I </a:t>
+            </a:r>
+            <a:r>
+              <a:rPr lang="en-CA" dirty="0" err="1"/>
+              <a:t>wanna</a:t>
+            </a:r>
+            <a:r>
+              <a:rPr lang="en-CA" dirty="0"/>
+              <a:t> learn. It covers a lot thing like:</a:t>
+            </a:r>
+          </a:p>
+          <a:p>
+            <a:pPr fontAlgn="base"/>
+            <a:r>
+              <a:rPr lang="en-CA" dirty="0"/>
+              <a:t>Persistent data storage</a:t>
+            </a:r>
+          </a:p>
+          <a:p>
+            <a:pPr fontAlgn="base"/>
+            <a:r>
+              <a:rPr lang="en-CA" dirty="0"/>
+              <a:t>Making adapters and using them in recycler view</a:t>
+            </a:r>
+          </a:p>
+          <a:p>
+            <a:pPr fontAlgn="base"/>
+            <a:r>
+              <a:rPr lang="en-CA" dirty="0"/>
+              <a:t>Dealing with observables and updating when their value </a:t>
+            </a:r>
+            <a:r>
+              <a:rPr lang="en-CA" dirty="0" err="1"/>
+              <a:t>chnages</a:t>
+            </a:r>
+            <a:endParaRPr lang="en-CA" dirty="0"/>
+          </a:p>
+          <a:p>
+            <a:pPr fontAlgn="base"/>
+            <a:r>
+              <a:rPr lang="en-CA" dirty="0"/>
+              <a:t>Android Navigation</a:t>
+            </a:r>
+          </a:p>
+          <a:p>
+            <a:pPr fontAlgn="base"/>
+            <a:r>
+              <a:rPr lang="en-CA" dirty="0"/>
+              <a:t>There are many features that you can add to it to make it more complex like remote syncing, password protection, labels for notes, etc. From my experience, it is a great place to start</a:t>
+            </a:r>
+          </a:p>
+          <a:p>
+            <a:endParaRPr lang="en-CA" dirty="0"/>
+          </a:p>
+        </p:txBody>
+      </p:sp>
+    </p:spTree>
+    <p:extLst>
+      <p:ext uri="{BB962C8B-B14F-4D97-AF65-F5344CB8AC3E}">
+        <p14:creationId xmlns:p14="http://schemas.microsoft.com/office/powerpoint/2010/main" val="1400746127"/>
+      </p:ext>
+    </p:extLst>
+  </p:cSld>
+  <p:clrMapOvr>
+    <a:masterClrMapping/>
+  </p:clrMapOvr>
+  <p:timing>
+    <p:tnLst>
+      <p:par>
+        <p:cTn id="1" dur="indefinite" restart="never" nodeType="tmRoot"/>
+      </p:par>
+    </p:tnLst>
+  </p:timing>
+</p:sld>
+</file>
+
+<file path=ppt/slides/slide4.xml><?xml version="1.0" encoding="utf-8"?>
+<p:sld xmlns:a="http://schemas.openxmlformats.org/drawingml/2006/main" xmlns:r="http://schemas.openxmlformats.org/officeDocument/2006/relationships" xmlns:p="http://schemas.openxmlformats.org/presentationml/2006/main">
+  <p:cSld>
+    <p:spTree>
+      <p:nvGrpSpPr>
+        <p:cNvPr id="1" name=""/>
+        <p:cNvGrpSpPr/>
+        <p:nvPr/>
+      </p:nvGrpSpPr>
+      <p:grpSpPr>
+        <a:xfrm>
+          <a:off x="0" y="0"/>
+          <a:ext cx="0" cy="0"/>
+          <a:chOff x="0" y="0"/>
+          <a:chExt cx="0" cy="0"/>
+        </a:xfrm>
+      </p:grpSpPr>
+      <p:sp>
+        <p:nvSpPr>
+          <p:cNvPr id="2" name="Title 1"/>
+          <p:cNvSpPr>
+            <a:spLocks noGrp="1"/>
+          </p:cNvSpPr>
+          <p:nvPr>
+            <p:ph type="title"/>
+          </p:nvPr>
+        </p:nvSpPr>
+        <p:spPr/>
+        <p:txBody>
+          <a:bodyPr/>
+          <a:lstStyle/>
+          <a:p>
+            <a:r>
+              <a:rPr lang="en-CA" dirty="0" smtClean="0"/>
+              <a:t>Summary</a:t>
+            </a:r>
+            <a:endParaRPr lang="en-CA" dirty="0"/>
+          </a:p>
+        </p:txBody>
+      </p:sp>
+      <p:sp>
+        <p:nvSpPr>
+          <p:cNvPr id="3" name="Content Placeholder 2"/>
+          <p:cNvSpPr>
+            <a:spLocks noGrp="1"/>
+          </p:cNvSpPr>
+          <p:nvPr>
+            <p:ph idx="1"/>
+          </p:nvPr>
+        </p:nvSpPr>
+        <p:spPr/>
+        <p:txBody>
+          <a:bodyPr/>
+          <a:lstStyle/>
+          <a:p>
+            <a:r>
+              <a:rPr lang="en-CA" dirty="0" smtClean="0"/>
+              <a:t>194 billion downloads worldwide (2018)</a:t>
+            </a:r>
+          </a:p>
+          <a:p>
+            <a:r>
+              <a:rPr lang="en-CA" dirty="0" smtClean="0"/>
+              <a:t>$101 billion worldwide app store consumer spend (2018)</a:t>
+            </a:r>
+          </a:p>
+          <a:p>
+            <a:r>
+              <a:rPr lang="en-CA" dirty="0" smtClean="0"/>
+              <a:t>3 hours per day spent in mobile by average user (2018)</a:t>
+            </a:r>
+          </a:p>
+          <a:p>
+            <a:r>
+              <a:rPr lang="en-CA" dirty="0" smtClean="0"/>
+              <a:t>360% higher average IPO for companies with mobile focus</a:t>
+            </a:r>
+          </a:p>
+          <a:p>
+            <a:pPr lvl="1"/>
+            <a:r>
+              <a:rPr lang="en-CA" dirty="0" smtClean="0"/>
+              <a:t>Snapchat, line, candy crush, tinder, </a:t>
+            </a:r>
+            <a:r>
+              <a:rPr lang="en-CA" dirty="0" err="1" smtClean="0"/>
+              <a:t>uber</a:t>
+            </a:r>
+            <a:r>
+              <a:rPr lang="en-CA" dirty="0" smtClean="0"/>
+              <a:t>, etc..</a:t>
+            </a:r>
+          </a:p>
+          <a:p>
+            <a:r>
+              <a:rPr lang="en-CA" dirty="0" smtClean="0"/>
+              <a:t>30% higher engagement in non-gaming apps for gen Z vs older demographics </a:t>
+            </a:r>
+            <a:endParaRPr lang="en-CA" dirty="0"/>
+          </a:p>
+        </p:txBody>
+      </p:sp>
+    </p:spTree>
+    <p:extLst>
+      <p:ext uri="{BB962C8B-B14F-4D97-AF65-F5344CB8AC3E}">
+        <p14:creationId xmlns:p14="http://schemas.microsoft.com/office/powerpoint/2010/main" val="588206025"/>
+      </p:ext>
+    </p:extLst>
+  </p:cSld>
+  <p:clrMapOvr>
+    <a:masterClrMapping/>
+  </p:clrMapOvr>
+  <p:timing>
+    <p:tnLst>
+      <p:par>
+        <p:cTn id="1" dur="indefinite" restart="never" nodeType="tmRoot"/>
+      </p:par>
+    </p:tnLst>
+  </p:timing>
 </p:sld>
 </file>
 
@@ -3667,7 +7322,7 @@
           <a:p>
             <a:r>
               <a:rPr lang="en-CA" dirty="0" smtClean="0"/>
-              <a:t>Learning app through examples:</a:t>
+              <a:t>Macro trends</a:t>
             </a:r>
             <a:endParaRPr lang="en-CA" dirty="0"/>
           </a:p>
@@ -3683,87 +7338,79 @@
             <p:ph idx="1"/>
           </p:nvPr>
         </p:nvSpPr>
-        <p:spPr/>
+        <p:spPr>
+          <a:xfrm>
+            <a:off x="838200" y="1825625"/>
+            <a:ext cx="2860964" cy="4351338"/>
+          </a:xfrm>
+        </p:spPr>
         <p:txBody>
           <a:bodyPr>
-            <a:normAutofit fontScale="92500" lnSpcReduction="10000"/>
+            <a:normAutofit fontScale="70000" lnSpcReduction="20000"/>
           </a:bodyPr>
           <a:lstStyle/>
           <a:p>
             <a:r>
               <a:rPr lang="en-CA" dirty="0" smtClean="0"/>
-              <a:t>The location tracker app</a:t>
-            </a:r>
-          </a:p>
-          <a:p>
-            <a:r>
-              <a:rPr lang="en-CA" dirty="0" smtClean="0"/>
-              <a:t>The system scanning app</a:t>
-            </a:r>
-          </a:p>
-          <a:p>
-            <a:r>
-              <a:rPr lang="en-CA" dirty="0" smtClean="0"/>
-              <a:t>The multimedia streaming app</a:t>
-            </a:r>
-          </a:p>
-          <a:p>
-            <a:r>
-              <a:rPr lang="en-CA" dirty="0" smtClean="0"/>
-              <a:t>The messenger/communication app</a:t>
-            </a:r>
-          </a:p>
-          <a:p>
-            <a:r>
-              <a:rPr lang="en-CA" dirty="0" smtClean="0"/>
-              <a:t>The game app</a:t>
-            </a:r>
-          </a:p>
-          <a:p>
-            <a:pPr lvl="1"/>
-            <a:r>
-              <a:rPr lang="en-CA" dirty="0" smtClean="0"/>
-              <a:t>Unity, graphics2D, </a:t>
-            </a:r>
-            <a:r>
-              <a:rPr lang="en-CA" dirty="0" err="1" smtClean="0"/>
-              <a:t>openGL</a:t>
-            </a:r>
-            <a:endParaRPr lang="en-CA" dirty="0" smtClean="0"/>
-          </a:p>
-          <a:p>
-            <a:r>
-              <a:rPr lang="en-CA" dirty="0" smtClean="0"/>
-              <a:t>The social media/sharing app</a:t>
-            </a:r>
-          </a:p>
-          <a:p>
-            <a:r>
-              <a:rPr lang="en-CA" dirty="0" smtClean="0"/>
-              <a:t>The selfie editing app</a:t>
-            </a:r>
-          </a:p>
-          <a:p>
+              <a:t>Experimentation: strong download numbers driven by new mobile device owners discovering and experimenting with new apps</a:t>
+            </a:r>
+          </a:p>
+          <a:p>
+            <a:r>
+              <a:rPr lang="en-CA" dirty="0" smtClean="0"/>
+              <a:t>Adoption: engagement climbs as mobile habits begin to form and users settle in to their go-to apps</a:t>
+            </a:r>
+          </a:p>
+          <a:p>
+            <a:r>
+              <a:rPr lang="en-CA" dirty="0" smtClean="0"/>
+              <a:t>Ubiquity: increased engagement and consumer spend as mobile takes over consumer mindshare</a:t>
+            </a:r>
             <a:endParaRPr lang="en-CA" dirty="0"/>
           </a:p>
-          <a:p>
-            <a:r>
-              <a:rPr lang="en-CA" dirty="0" smtClean="0"/>
-              <a:t>What do all these apps have in common? UI, </a:t>
-            </a:r>
-          </a:p>
-        </p:txBody>
-      </p:sp>
+        </p:txBody>
+      </p:sp>
+      <p:pic>
+        <p:nvPicPr>
+          <p:cNvPr id="4" name="Picture 3"/>
+          <p:cNvPicPr>
+            <a:picLocks noChangeAspect="1"/>
+          </p:cNvPicPr>
+          <p:nvPr/>
+        </p:nvPicPr>
+        <p:blipFill>
+          <a:blip r:embed="rId2"/>
+          <a:stretch>
+            <a:fillRect/>
+          </a:stretch>
+        </p:blipFill>
+        <p:spPr>
+          <a:xfrm>
+            <a:off x="3597100" y="1500982"/>
+            <a:ext cx="8594900" cy="4675982"/>
+          </a:xfrm>
+          <a:prstGeom prst="rect">
+            <a:avLst/>
+          </a:prstGeom>
+        </p:spPr>
+      </p:pic>
     </p:spTree>
     <p:extLst>
       <p:ext uri="{BB962C8B-B14F-4D97-AF65-F5344CB8AC3E}">
-        <p14:creationId xmlns:p14="http://schemas.microsoft.com/office/powerpoint/2010/main" val="4230979639"/>
+        <p14:creationId xmlns:p14="http://schemas.microsoft.com/office/powerpoint/2010/main" val="1250407038"/>
       </p:ext>
     </p:extLst>
   </p:cSld>
   <p:clrMapOvr>
     <a:masterClrMapping/>
   </p:clrMapOvr>
+  <p:timing>
+    <p:tnLst>
+      <p:par>
+        <p:cTn id="1" dur="indefinite" restart="never" nodeType="tmRoot"/>
+      </p:par>
+    </p:tnLst>
+  </p:timing>
 </p:sld>
 </file>
 
@@ -3801,7 +7448,7 @@
           <a:p>
             <a:r>
               <a:rPr lang="en-CA" dirty="0" smtClean="0"/>
-              <a:t>Reverse engineer popular apps</a:t>
+              <a:t>Download trends</a:t>
             </a:r>
             <a:endParaRPr lang="en-CA" dirty="0"/>
           </a:p>
@@ -3817,14 +7464,51 @@
             <p:ph idx="1"/>
           </p:nvPr>
         </p:nvSpPr>
-        <p:spPr/>
-        <p:txBody>
-          <a:bodyPr/>
-          <a:lstStyle/>
-          <a:p>
-            <a:r>
-              <a:rPr lang="en-CA" dirty="0" smtClean="0"/>
-              <a:t>Reverse engineer popular apps, and replicate their basic functionality</a:t>
+        <p:spPr>
+          <a:xfrm>
+            <a:off x="838200" y="1825625"/>
+            <a:ext cx="3572429" cy="4351338"/>
+          </a:xfrm>
+        </p:spPr>
+        <p:txBody>
+          <a:bodyPr>
+            <a:normAutofit fontScale="62500" lnSpcReduction="20000"/>
+          </a:bodyPr>
+          <a:lstStyle/>
+          <a:p>
+            <a:r>
+              <a:rPr lang="en-CA" dirty="0" smtClean="0"/>
+              <a:t>Downloads up 35% from 2016 to 2018 (exceeded 194,000,000,000 in 2018) </a:t>
+            </a:r>
+          </a:p>
+          <a:p>
+            <a:r>
+              <a:rPr lang="en-CA" dirty="0" smtClean="0"/>
+              <a:t>China accounted for nearly 50% of downloads across iOS and Android</a:t>
+            </a:r>
+          </a:p>
+          <a:p>
+            <a:r>
+              <a:rPr lang="en-CA" dirty="0" smtClean="0"/>
+              <a:t>Emerging markets continue to fuel download growth</a:t>
+            </a:r>
+          </a:p>
+          <a:p>
+            <a:r>
+              <a:rPr lang="en-CA" dirty="0" smtClean="0"/>
+              <a:t>Mature markets (US) continue to see strong download numbers but growth has slowed</a:t>
+            </a:r>
+          </a:p>
+          <a:p>
+            <a:r>
+              <a:rPr lang="en-CA" dirty="0" smtClean="0"/>
+              <a:t>Mature markets growing strongly in other metrics (engagement and spend)</a:t>
+            </a:r>
+          </a:p>
+          <a:p>
+            <a:r>
+              <a:rPr lang="en-CA" dirty="0" smtClean="0"/>
+              <a:t>Games account for 35% of all downloads</a:t>
             </a:r>
           </a:p>
           <a:p>
@@ -3832,16 +7516,47 @@
           </a:p>
         </p:txBody>
       </p:sp>
+      <p:pic>
+        <p:nvPicPr>
+          <p:cNvPr id="4" name="Picture 3"/>
+          <p:cNvPicPr>
+            <a:picLocks noChangeAspect="1"/>
+          </p:cNvPicPr>
+          <p:nvPr/>
+        </p:nvPicPr>
+        <p:blipFill>
+          <a:blip r:embed="rId2"/>
+          <a:stretch>
+            <a:fillRect/>
+          </a:stretch>
+        </p:blipFill>
+        <p:spPr>
+          <a:xfrm>
+            <a:off x="4410629" y="1690688"/>
+            <a:ext cx="7781371" cy="4211782"/>
+          </a:xfrm>
+          <a:prstGeom prst="rect">
+            <a:avLst/>
+          </a:prstGeom>
+        </p:spPr>
+      </p:pic>
     </p:spTree>
     <p:extLst>
       <p:ext uri="{BB962C8B-B14F-4D97-AF65-F5344CB8AC3E}">
-        <p14:creationId xmlns:p14="http://schemas.microsoft.com/office/powerpoint/2010/main" val="4139711775"/>
+        <p14:creationId xmlns:p14="http://schemas.microsoft.com/office/powerpoint/2010/main" val="1992450565"/>
       </p:ext>
     </p:extLst>
   </p:cSld>
   <p:clrMapOvr>
     <a:masterClrMapping/>
   </p:clrMapOvr>
+  <p:timing>
+    <p:tnLst>
+      <p:par>
+        <p:cTn id="1" dur="indefinite" restart="never" nodeType="tmRoot"/>
+      </p:par>
+    </p:tnLst>
+  </p:timing>
 </p:sld>
 </file>
 
@@ -3877,7 +7592,11 @@
           <a:bodyPr/>
           <a:lstStyle/>
           <a:p>
-            <a:endParaRPr lang="en-CA"/>
+            <a:r>
+              <a:rPr lang="en-CA" dirty="0" smtClean="0"/>
+              <a:t>Spending trends</a:t>
+            </a:r>
+            <a:endParaRPr lang="en-CA" dirty="0"/>
           </a:p>
         </p:txBody>
       </p:sp>
@@ -3891,77 +7610,105 @@
             <p:ph idx="1"/>
           </p:nvPr>
         </p:nvSpPr>
-        <p:spPr/>
+        <p:spPr>
+          <a:xfrm>
+            <a:off x="838200" y="1825625"/>
+            <a:ext cx="3900055" cy="4351338"/>
+          </a:xfrm>
+        </p:spPr>
         <p:txBody>
           <a:bodyPr>
-            <a:normAutofit lnSpcReduction="10000"/>
+            <a:normAutofit fontScale="70000" lnSpcReduction="20000"/>
           </a:bodyPr>
           <a:lstStyle/>
           <a:p>
-            <a:pPr fontAlgn="base"/>
-            <a:r>
-              <a:rPr lang="en-CA" dirty="0"/>
-              <a:t>An imaginary real estate agent / realtor app. Give them a test web service with a few endpoints:</a:t>
-            </a:r>
-          </a:p>
-          <a:p>
-            <a:pPr fontAlgn="base"/>
-            <a:r>
-              <a:rPr lang="en-CA" dirty="0"/>
-              <a:t>List of properties</a:t>
-            </a:r>
-          </a:p>
-          <a:p>
-            <a:pPr fontAlgn="base"/>
-            <a:r>
-              <a:rPr lang="en-CA" dirty="0"/>
-              <a:t>Property details</a:t>
-            </a:r>
-          </a:p>
-          <a:p>
-            <a:pPr fontAlgn="base"/>
-            <a:r>
-              <a:rPr lang="en-CA" dirty="0"/>
-              <a:t>Maybe tokenized user login (bonus points)</a:t>
-            </a:r>
-          </a:p>
-          <a:p>
-            <a:pPr fontAlgn="base"/>
-            <a:r>
-              <a:rPr lang="en-CA" dirty="0"/>
-              <a:t>Maybe add favourites (bonus points)</a:t>
-            </a:r>
-          </a:p>
-          <a:p>
-            <a:pPr fontAlgn="base"/>
-            <a:r>
-              <a:rPr lang="en-CA" dirty="0"/>
-              <a:t>Making this work would cover a good amount of basic Android development: fragments, layouts, lists, </a:t>
-            </a:r>
-            <a:r>
-              <a:rPr lang="en-CA" dirty="0" err="1"/>
-              <a:t>async</a:t>
-            </a:r>
-            <a:r>
-              <a:rPr lang="en-CA" dirty="0"/>
-              <a:t> image loading, infinite scroll, adapters, web service interaction, navigation, Google Maps display etc.</a:t>
-            </a:r>
-          </a:p>
-          <a:p>
+            <a:r>
+              <a:rPr lang="en-CA" dirty="0" smtClean="0"/>
+              <a:t>Consumer spend up 75% from 2016, to 101,000,000,000 </a:t>
+            </a:r>
+          </a:p>
+          <a:p>
+            <a:r>
+              <a:rPr lang="en-CA" dirty="0" smtClean="0"/>
+              <a:t>Paid downloads, in-app purchases, in-app subscriptions</a:t>
+            </a:r>
+          </a:p>
+          <a:p>
+            <a:r>
+              <a:rPr lang="en-CA" dirty="0" smtClean="0"/>
+              <a:t>Does NOT include payments outside app store (Uber, Amazon, </a:t>
+            </a:r>
+            <a:r>
+              <a:rPr lang="en-CA" dirty="0" err="1" smtClean="0"/>
+              <a:t>etc</a:t>
+            </a:r>
+            <a:r>
+              <a:rPr lang="en-CA" dirty="0" smtClean="0"/>
+              <a:t>) or revenue from in-app advertising</a:t>
+            </a:r>
+          </a:p>
+          <a:p>
+            <a:r>
+              <a:rPr lang="en-CA" dirty="0" smtClean="0"/>
+              <a:t>China accounted for 40% of consumer spend in 2018</a:t>
+            </a:r>
+          </a:p>
+          <a:p>
+            <a:r>
+              <a:rPr lang="en-CA" dirty="0" smtClean="0"/>
+              <a:t>Games accounted for 74% of consumer spend in 2018</a:t>
+            </a:r>
+          </a:p>
+          <a:p>
+            <a:r>
+              <a:rPr lang="en-CA" dirty="0" smtClean="0"/>
+              <a:t>Non-gaming apps accounted for 26% of consumer spend in 2018, up from 18% in 2016 due to growth in in-app subscriptions</a:t>
+            </a:r>
             <a:endParaRPr lang="en-CA" dirty="0"/>
           </a:p>
         </p:txBody>
       </p:sp>
+      <p:pic>
+        <p:nvPicPr>
+          <p:cNvPr id="4" name="Picture 3"/>
+          <p:cNvPicPr>
+            <a:picLocks noChangeAspect="1"/>
+          </p:cNvPicPr>
+          <p:nvPr/>
+        </p:nvPicPr>
+        <p:blipFill>
+          <a:blip r:embed="rId2"/>
+          <a:stretch>
+            <a:fillRect/>
+          </a:stretch>
+        </p:blipFill>
+        <p:spPr>
+          <a:xfrm>
+            <a:off x="4543186" y="1825625"/>
+            <a:ext cx="7537977" cy="3932527"/>
+          </a:xfrm>
+          <a:prstGeom prst="rect">
+            <a:avLst/>
+          </a:prstGeom>
+        </p:spPr>
+      </p:pic>
     </p:spTree>
     <p:extLst>
       <p:ext uri="{BB962C8B-B14F-4D97-AF65-F5344CB8AC3E}">
-        <p14:creationId xmlns:p14="http://schemas.microsoft.com/office/powerpoint/2010/main" val="521289777"/>
+        <p14:creationId xmlns:p14="http://schemas.microsoft.com/office/powerpoint/2010/main" val="4037029102"/>
       </p:ext>
     </p:extLst>
   </p:cSld>
   <p:clrMapOvr>
     <a:masterClrMapping/>
   </p:clrMapOvr>
+  <p:timing>
+    <p:tnLst>
+      <p:par>
+        <p:cTn id="1" dur="indefinite" restart="never" nodeType="tmRoot"/>
+      </p:par>
+    </p:tnLst>
+  </p:timing>
 </p:sld>
 </file>
 
@@ -3997,7 +7744,11 @@
           <a:bodyPr/>
           <a:lstStyle/>
           <a:p>
-            <a:endParaRPr lang="en-CA"/>
+            <a:r>
+              <a:rPr lang="en-CA" dirty="0" smtClean="0"/>
+              <a:t>Engagement trends</a:t>
+            </a:r>
+            <a:endParaRPr lang="en-CA" dirty="0"/>
           </a:p>
         </p:txBody>
       </p:sp>
@@ -4011,44 +7762,114 @@
             <p:ph idx="1"/>
           </p:nvPr>
         </p:nvSpPr>
-        <p:spPr/>
-        <p:txBody>
-          <a:bodyPr/>
-          <a:lstStyle/>
-          <a:p>
-            <a:r>
-              <a:rPr lang="en-CA" dirty="0"/>
-              <a:t>The majority of android development is making an </a:t>
-            </a:r>
-            <a:r>
-              <a:rPr lang="en-CA" dirty="0" err="1"/>
-              <a:t>api</a:t>
-            </a:r>
-            <a:r>
-              <a:rPr lang="en-CA" dirty="0"/>
-              <a:t> call and displaying a list of data from that. You'll probably want to cover that. And something to include custom views/</a:t>
-            </a:r>
-            <a:r>
-              <a:rPr lang="en-CA" dirty="0" err="1"/>
-              <a:t>viewgroups</a:t>
-            </a:r>
-            <a:r>
-              <a:rPr lang="en-CA" dirty="0"/>
-              <a:t> and what role those play</a:t>
-            </a:r>
-          </a:p>
-        </p:txBody>
-      </p:sp>
+        <p:spPr>
+          <a:xfrm>
+            <a:off x="838200" y="1825624"/>
+            <a:ext cx="3609109" cy="4824557"/>
+          </a:xfrm>
+        </p:spPr>
+        <p:txBody>
+          <a:bodyPr>
+            <a:normAutofit fontScale="92500" lnSpcReduction="20000"/>
+          </a:bodyPr>
+          <a:lstStyle/>
+          <a:p>
+            <a:r>
+              <a:rPr lang="en-CA" dirty="0" smtClean="0"/>
+              <a:t>Time spent in apps grew 50% from 2016 to 2018</a:t>
+            </a:r>
+          </a:p>
+          <a:p>
+            <a:r>
+              <a:rPr lang="en-CA" dirty="0" smtClean="0"/>
+              <a:t>Led by: (110% growth)</a:t>
+            </a:r>
+          </a:p>
+          <a:p>
+            <a:pPr lvl="1"/>
+            <a:r>
+              <a:rPr lang="en-CA" dirty="0" smtClean="0"/>
+              <a:t>Video players/editors</a:t>
+            </a:r>
+          </a:p>
+          <a:p>
+            <a:pPr lvl="1"/>
+            <a:r>
+              <a:rPr lang="en-CA" dirty="0" smtClean="0"/>
+              <a:t>Entertainment</a:t>
+            </a:r>
+          </a:p>
+          <a:p>
+            <a:pPr lvl="1"/>
+            <a:r>
+              <a:rPr lang="en-CA" dirty="0" smtClean="0"/>
+              <a:t>Photography</a:t>
+            </a:r>
+          </a:p>
+          <a:p>
+            <a:pPr lvl="1"/>
+            <a:r>
+              <a:rPr lang="en-CA" dirty="0" smtClean="0"/>
+              <a:t>Tools and finance</a:t>
+            </a:r>
+          </a:p>
+          <a:p>
+            <a:r>
+              <a:rPr lang="en-CA" dirty="0" smtClean="0"/>
+              <a:t>50% of time spent on mobile devices is in social and communications apps</a:t>
+            </a:r>
+          </a:p>
+          <a:p>
+            <a:pPr lvl="1"/>
+            <a:r>
+              <a:rPr lang="en-CA" dirty="0" smtClean="0"/>
+              <a:t>15% in video players/editors, 10% in games</a:t>
+            </a:r>
+            <a:endParaRPr lang="en-CA" dirty="0"/>
+          </a:p>
+        </p:txBody>
+      </p:sp>
+      <p:pic>
+        <p:nvPicPr>
+          <p:cNvPr id="4" name="Picture 3"/>
+          <p:cNvPicPr>
+            <a:picLocks noChangeAspect="1"/>
+          </p:cNvPicPr>
+          <p:nvPr/>
+        </p:nvPicPr>
+        <p:blipFill>
+          <a:blip r:embed="rId2"/>
+          <a:stretch>
+            <a:fillRect/>
+          </a:stretch>
+        </p:blipFill>
+        <p:spPr>
+          <a:xfrm>
+            <a:off x="4467538" y="2122774"/>
+            <a:ext cx="7724462" cy="4230255"/>
+          </a:xfrm>
+          <a:prstGeom prst="rect">
+            <a:avLst/>
+          </a:prstGeom>
+        </p:spPr>
+      </p:pic>
     </p:spTree>
     <p:extLst>
       <p:ext uri="{BB962C8B-B14F-4D97-AF65-F5344CB8AC3E}">
-        <p14:creationId xmlns:p14="http://schemas.microsoft.com/office/powerpoint/2010/main" val="2251604124"/>
+        <p14:creationId xmlns:p14="http://schemas.microsoft.com/office/powerpoint/2010/main" val="4085741270"/>
       </p:ext>
     </p:extLst>
   </p:cSld>
   <p:clrMapOvr>
     <a:masterClrMapping/>
   </p:clrMapOvr>
+  <p:timing>
+    <p:tnLst>
+      <p:par>
+        <p:cTn id="1" dur="indefinite" restart="never" nodeType="tmRoot"/>
+      </p:par>
+    </p:tnLst>
+  </p:timing>
 </p:sld>
 </file>
 
@@ -4084,7 +7905,11 @@
           <a:bodyPr/>
           <a:lstStyle/>
           <a:p>
-            <a:endParaRPr lang="en-CA"/>
+            <a:r>
+              <a:rPr lang="en-CA" dirty="0" smtClean="0"/>
+              <a:t>Daily use trends</a:t>
+            </a:r>
+            <a:endParaRPr lang="en-CA" dirty="0"/>
           </a:p>
         </p:txBody>
       </p:sp>
@@ -4098,80 +7923,89 @@
             <p:ph idx="1"/>
           </p:nvPr>
         </p:nvSpPr>
-        <p:spPr/>
-        <p:txBody>
-          <a:bodyPr/>
-          <a:lstStyle/>
-          <a:p>
-            <a:pPr fontAlgn="base"/>
-            <a:r>
-              <a:rPr lang="en-CA" dirty="0"/>
-              <a:t>A note taking app. This is what I build for new frameworks that I </a:t>
-            </a:r>
-            <a:r>
-              <a:rPr lang="en-CA" dirty="0" err="1"/>
-              <a:t>wanna</a:t>
-            </a:r>
-            <a:r>
-              <a:rPr lang="en-CA" dirty="0"/>
-              <a:t> learn. It covers a lot thing like:</a:t>
-            </a:r>
-          </a:p>
-          <a:p>
-            <a:pPr fontAlgn="base"/>
-            <a:r>
-              <a:rPr lang="en-CA" dirty="0"/>
-              <a:t>Persistent data storage</a:t>
-            </a:r>
-          </a:p>
-          <a:p>
-            <a:pPr fontAlgn="base"/>
-            <a:r>
-              <a:rPr lang="en-CA" dirty="0"/>
-              <a:t>Making adapters and using them in recycler view</a:t>
-            </a:r>
-          </a:p>
-          <a:p>
-            <a:pPr fontAlgn="base"/>
-            <a:r>
-              <a:rPr lang="en-CA" dirty="0"/>
-              <a:t>Dealing with observables and updating when their value </a:t>
-            </a:r>
-            <a:r>
-              <a:rPr lang="en-CA" dirty="0" err="1"/>
-              <a:t>chnages</a:t>
-            </a:r>
+        <p:spPr>
+          <a:xfrm>
+            <a:off x="838200" y="1825625"/>
+            <a:ext cx="4066309" cy="4351338"/>
+          </a:xfrm>
+        </p:spPr>
+        <p:txBody>
+          <a:bodyPr>
+            <a:normAutofit fontScale="92500" lnSpcReduction="10000"/>
+          </a:bodyPr>
+          <a:lstStyle/>
+          <a:p>
+            <a:r>
+              <a:rPr lang="en-CA" dirty="0" smtClean="0"/>
+              <a:t>Mobile users spent over 4 hours a day on their devices in Indonesia</a:t>
+            </a:r>
+          </a:p>
+          <a:p>
+            <a:r>
+              <a:rPr lang="en-CA" dirty="0" smtClean="0"/>
+              <a:t>3 hours per day in mature markets (US/Canada)</a:t>
+            </a:r>
+          </a:p>
+          <a:p>
+            <a:r>
+              <a:rPr lang="en-CA" dirty="0" smtClean="0"/>
+              <a:t>Time spent mostly performing micro-movements (checking email/bank, browsing news, </a:t>
+            </a:r>
+            <a:r>
+              <a:rPr lang="en-CA" dirty="0" err="1" smtClean="0"/>
+              <a:t>etc</a:t>
+            </a:r>
+            <a:r>
+              <a:rPr lang="en-CA" dirty="0" smtClean="0"/>
+              <a:t>) as well as gaming, social media, and streaming</a:t>
+            </a:r>
+          </a:p>
+          <a:p>
             <a:endParaRPr lang="en-CA" dirty="0"/>
           </a:p>
-          <a:p>
-            <a:pPr fontAlgn="base"/>
-            <a:r>
-              <a:rPr lang="en-CA" dirty="0"/>
-              <a:t>Android Navigation</a:t>
-            </a:r>
-          </a:p>
-          <a:p>
-            <a:pPr fontAlgn="base"/>
-            <a:r>
-              <a:rPr lang="en-CA" dirty="0"/>
-              <a:t>There are many features that you can add to it to make it more complex like remote syncing, password protection, labels for notes, etc. From my experience, it is a great place to start</a:t>
-            </a:r>
-          </a:p>
-          <a:p>
-            <a:endParaRPr lang="en-CA" dirty="0"/>
-          </a:p>
-        </p:txBody>
-      </p:sp>
+        </p:txBody>
+      </p:sp>
+      <p:pic>
+        <p:nvPicPr>
+          <p:cNvPr id="4" name="Picture 3"/>
+          <p:cNvPicPr>
+            <a:picLocks noChangeAspect="1"/>
+          </p:cNvPicPr>
+          <p:nvPr/>
+        </p:nvPicPr>
+        <p:blipFill>
+          <a:blip r:embed="rId2"/>
+          <a:stretch>
+            <a:fillRect/>
+          </a:stretch>
+        </p:blipFill>
+        <p:spPr>
+          <a:xfrm>
+            <a:off x="4784278" y="1454727"/>
+            <a:ext cx="7407722" cy="4496016"/>
+          </a:xfrm>
+          <a:prstGeom prst="rect">
+            <a:avLst/>
+          </a:prstGeom>
+        </p:spPr>
+      </p:pic>
     </p:spTree>
     <p:extLst>
       <p:ext uri="{BB962C8B-B14F-4D97-AF65-F5344CB8AC3E}">
-        <p14:creationId xmlns:p14="http://schemas.microsoft.com/office/powerpoint/2010/main" val="1400746127"/>
+        <p14:creationId xmlns:p14="http://schemas.microsoft.com/office/powerpoint/2010/main" val="3920227157"/>
       </p:ext>
     </p:extLst>
   </p:cSld>
   <p:clrMapOvr>
     <a:masterClrMapping/>
   </p:clrMapOvr>
+  <p:timing>
+    <p:tnLst>
+      <p:par>
+        <p:cTn id="1" dur="indefinite" restart="never" nodeType="tmRoot"/>
+      </p:par>
+    </p:tnLst>
+  </p:timing>
 </p:sld>
 </file>
 

</xml_diff>